<commit_message>
Updated Lecture 9 code
</commit_message>
<xml_diff>
--- a/lecture_09/Frontend JavaScript and Client-Side Form Validation.pptx
+++ b/lecture_09/Frontend JavaScript and Client-Side Form Validation.pptx
@@ -13,10 +13,10 @@
     <p:sldMasterId id="2147483761" r:id="rId9"/>
   </p:sldMasterIdLst>
   <p:notesMasterIdLst>
-    <p:notesMasterId r:id="rId37"/>
+    <p:notesMasterId r:id="rId38"/>
   </p:notesMasterIdLst>
   <p:handoutMasterIdLst>
-    <p:handoutMasterId r:id="rId38"/>
+    <p:handoutMasterId r:id="rId39"/>
   </p:handoutMasterIdLst>
   <p:sldIdLst>
     <p:sldId id="293" r:id="rId10"/>
@@ -46,6 +46,7 @@
     <p:sldId id="330" r:id="rId34"/>
     <p:sldId id="311" r:id="rId35"/>
     <p:sldId id="313" r:id="rId36"/>
+    <p:sldId id="392" r:id="rId37"/>
   </p:sldIdLst>
   <p:sldSz cx="12188825" cy="6858000"/>
   <p:notesSz cx="6858000" cy="9144000"/>
@@ -274,7 +275,7 @@
           <a:p>
             <a:fld id="{DD7909B4-0034-084A-82BA-DE59354427DE}" type="datetime1">
               <a:rPr lang="en-US" smtClean="0"/>
-              <a:t>1/12/20</a:t>
+              <a:t>4/5/20</a:t>
             </a:fld>
             <a:endParaRPr lang="en-US"/>
           </a:p>
@@ -440,7 +441,7 @@
           <a:p>
             <a:fld id="{9BAEE3B6-A6CF-1B42-910E-8E290E739F0F}" type="datetime1">
               <a:rPr lang="en-US" smtClean="0"/>
-              <a:t>1/12/20</a:t>
+              <a:t>4/5/20</a:t>
             </a:fld>
             <a:endParaRPr lang="en-US"/>
           </a:p>
@@ -706,6 +707,2358 @@
     </a:lvl9pPr>
   </p:notesStyle>
 </p:notesMaster>
+</file>
+
+<file path=ppt/notesSlides/notesSlide1.xml><?xml version="1.0" encoding="utf-8"?>
+<p:notes xmlns:a="http://schemas.openxmlformats.org/drawingml/2006/main" xmlns:r="http://schemas.openxmlformats.org/officeDocument/2006/relationships" xmlns:p="http://schemas.openxmlformats.org/presentationml/2006/main">
+  <p:cSld>
+    <p:spTree>
+      <p:nvGrpSpPr>
+        <p:cNvPr id="1" name=""/>
+        <p:cNvGrpSpPr/>
+        <p:nvPr/>
+      </p:nvGrpSpPr>
+      <p:grpSpPr>
+        <a:xfrm>
+          <a:off x="0" y="0"/>
+          <a:ext cx="0" cy="0"/>
+          <a:chOff x="0" y="0"/>
+          <a:chExt cx="0" cy="0"/>
+        </a:xfrm>
+      </p:grpSpPr>
+      <p:sp>
+        <p:nvSpPr>
+          <p:cNvPr id="2" name="Slide Image Placeholder 1"/>
+          <p:cNvSpPr>
+            <a:spLocks noGrp="1" noRot="1" noChangeAspect="1"/>
+          </p:cNvSpPr>
+          <p:nvPr>
+            <p:ph type="sldImg"/>
+          </p:nvPr>
+        </p:nvSpPr>
+        <p:spPr/>
+      </p:sp>
+      <p:sp>
+        <p:nvSpPr>
+          <p:cNvPr id="3" name="Notes Placeholder 2"/>
+          <p:cNvSpPr>
+            <a:spLocks noGrp="1"/>
+          </p:cNvSpPr>
+          <p:nvPr>
+            <p:ph type="body" idx="1"/>
+          </p:nvPr>
+        </p:nvSpPr>
+        <p:spPr/>
+        <p:txBody>
+          <a:bodyPr/>
+          <a:lstStyle/>
+          <a:p>
+            <a:endParaRPr lang="en-US"/>
+          </a:p>
+        </p:txBody>
+      </p:sp>
+      <p:sp>
+        <p:nvSpPr>
+          <p:cNvPr id="4" name="Slide Number Placeholder 3"/>
+          <p:cNvSpPr>
+            <a:spLocks noGrp="1"/>
+          </p:cNvSpPr>
+          <p:nvPr>
+            <p:ph type="sldNum" sz="quarter" idx="5"/>
+          </p:nvPr>
+        </p:nvSpPr>
+        <p:spPr/>
+        <p:txBody>
+          <a:bodyPr/>
+          <a:lstStyle/>
+          <a:p>
+            <a:fld id="{A6961DC2-A28F-4C81-9966-8D7B3191DD23}" type="slidenum">
+              <a:rPr lang="en-US" smtClean="0"/>
+              <a:t>1</a:t>
+            </a:fld>
+            <a:endParaRPr lang="en-US"/>
+          </a:p>
+        </p:txBody>
+      </p:sp>
+    </p:spTree>
+    <p:extLst>
+      <p:ext uri="{BB962C8B-B14F-4D97-AF65-F5344CB8AC3E}">
+        <p14:creationId xmlns:p14="http://schemas.microsoft.com/office/powerpoint/2010/main" val="570472256"/>
+      </p:ext>
+    </p:extLst>
+  </p:cSld>
+  <p:clrMapOvr>
+    <a:masterClrMapping/>
+  </p:clrMapOvr>
+</p:notes>
+</file>
+
+<file path=ppt/notesSlides/notesSlide10.xml><?xml version="1.0" encoding="utf-8"?>
+<p:notes xmlns:a="http://schemas.openxmlformats.org/drawingml/2006/main" xmlns:r="http://schemas.openxmlformats.org/officeDocument/2006/relationships" xmlns:p="http://schemas.openxmlformats.org/presentationml/2006/main">
+  <p:cSld>
+    <p:spTree>
+      <p:nvGrpSpPr>
+        <p:cNvPr id="1" name=""/>
+        <p:cNvGrpSpPr/>
+        <p:nvPr/>
+      </p:nvGrpSpPr>
+      <p:grpSpPr>
+        <a:xfrm>
+          <a:off x="0" y="0"/>
+          <a:ext cx="0" cy="0"/>
+          <a:chOff x="0" y="0"/>
+          <a:chExt cx="0" cy="0"/>
+        </a:xfrm>
+      </p:grpSpPr>
+      <p:sp>
+        <p:nvSpPr>
+          <p:cNvPr id="2" name="Slide Image Placeholder 1"/>
+          <p:cNvSpPr>
+            <a:spLocks noGrp="1" noRot="1" noChangeAspect="1"/>
+          </p:cNvSpPr>
+          <p:nvPr>
+            <p:ph type="sldImg"/>
+          </p:nvPr>
+        </p:nvSpPr>
+        <p:spPr/>
+      </p:sp>
+      <p:sp>
+        <p:nvSpPr>
+          <p:cNvPr id="3" name="Notes Placeholder 2"/>
+          <p:cNvSpPr>
+            <a:spLocks noGrp="1"/>
+          </p:cNvSpPr>
+          <p:nvPr>
+            <p:ph type="body" idx="1"/>
+          </p:nvPr>
+        </p:nvSpPr>
+        <p:spPr/>
+        <p:txBody>
+          <a:bodyPr/>
+          <a:lstStyle/>
+          <a:p>
+            <a:endParaRPr lang="en-US"/>
+          </a:p>
+        </p:txBody>
+      </p:sp>
+      <p:sp>
+        <p:nvSpPr>
+          <p:cNvPr id="4" name="Slide Number Placeholder 3"/>
+          <p:cNvSpPr>
+            <a:spLocks noGrp="1"/>
+          </p:cNvSpPr>
+          <p:nvPr>
+            <p:ph type="sldNum" sz="quarter" idx="5"/>
+          </p:nvPr>
+        </p:nvSpPr>
+        <p:spPr/>
+        <p:txBody>
+          <a:bodyPr/>
+          <a:lstStyle/>
+          <a:p>
+            <a:fld id="{A6961DC2-A28F-4C81-9966-8D7B3191DD23}" type="slidenum">
+              <a:rPr lang="en-US" smtClean="0"/>
+              <a:t>10</a:t>
+            </a:fld>
+            <a:endParaRPr lang="en-US"/>
+          </a:p>
+        </p:txBody>
+      </p:sp>
+    </p:spTree>
+    <p:extLst>
+      <p:ext uri="{BB962C8B-B14F-4D97-AF65-F5344CB8AC3E}">
+        <p14:creationId xmlns:p14="http://schemas.microsoft.com/office/powerpoint/2010/main" val="2569022661"/>
+      </p:ext>
+    </p:extLst>
+  </p:cSld>
+  <p:clrMapOvr>
+    <a:masterClrMapping/>
+  </p:clrMapOvr>
+</p:notes>
+</file>
+
+<file path=ppt/notesSlides/notesSlide11.xml><?xml version="1.0" encoding="utf-8"?>
+<p:notes xmlns:a="http://schemas.openxmlformats.org/drawingml/2006/main" xmlns:r="http://schemas.openxmlformats.org/officeDocument/2006/relationships" xmlns:p="http://schemas.openxmlformats.org/presentationml/2006/main">
+  <p:cSld>
+    <p:spTree>
+      <p:nvGrpSpPr>
+        <p:cNvPr id="1" name=""/>
+        <p:cNvGrpSpPr/>
+        <p:nvPr/>
+      </p:nvGrpSpPr>
+      <p:grpSpPr>
+        <a:xfrm>
+          <a:off x="0" y="0"/>
+          <a:ext cx="0" cy="0"/>
+          <a:chOff x="0" y="0"/>
+          <a:chExt cx="0" cy="0"/>
+        </a:xfrm>
+      </p:grpSpPr>
+      <p:sp>
+        <p:nvSpPr>
+          <p:cNvPr id="2" name="Slide Image Placeholder 1"/>
+          <p:cNvSpPr>
+            <a:spLocks noGrp="1" noRot="1" noChangeAspect="1"/>
+          </p:cNvSpPr>
+          <p:nvPr>
+            <p:ph type="sldImg"/>
+          </p:nvPr>
+        </p:nvSpPr>
+        <p:spPr/>
+      </p:sp>
+      <p:sp>
+        <p:nvSpPr>
+          <p:cNvPr id="3" name="Notes Placeholder 2"/>
+          <p:cNvSpPr>
+            <a:spLocks noGrp="1"/>
+          </p:cNvSpPr>
+          <p:nvPr>
+            <p:ph type="body" idx="1"/>
+          </p:nvPr>
+        </p:nvSpPr>
+        <p:spPr/>
+        <p:txBody>
+          <a:bodyPr/>
+          <a:lstStyle/>
+          <a:p>
+            <a:endParaRPr lang="en-US"/>
+          </a:p>
+        </p:txBody>
+      </p:sp>
+      <p:sp>
+        <p:nvSpPr>
+          <p:cNvPr id="4" name="Slide Number Placeholder 3"/>
+          <p:cNvSpPr>
+            <a:spLocks noGrp="1"/>
+          </p:cNvSpPr>
+          <p:nvPr>
+            <p:ph type="sldNum" sz="quarter" idx="5"/>
+          </p:nvPr>
+        </p:nvSpPr>
+        <p:spPr/>
+        <p:txBody>
+          <a:bodyPr/>
+          <a:lstStyle/>
+          <a:p>
+            <a:fld id="{A6961DC2-A28F-4C81-9966-8D7B3191DD23}" type="slidenum">
+              <a:rPr lang="en-US" smtClean="0"/>
+              <a:t>11</a:t>
+            </a:fld>
+            <a:endParaRPr lang="en-US"/>
+          </a:p>
+        </p:txBody>
+      </p:sp>
+    </p:spTree>
+    <p:extLst>
+      <p:ext uri="{BB962C8B-B14F-4D97-AF65-F5344CB8AC3E}">
+        <p14:creationId xmlns:p14="http://schemas.microsoft.com/office/powerpoint/2010/main" val="1687821818"/>
+      </p:ext>
+    </p:extLst>
+  </p:cSld>
+  <p:clrMapOvr>
+    <a:masterClrMapping/>
+  </p:clrMapOvr>
+</p:notes>
+</file>
+
+<file path=ppt/notesSlides/notesSlide12.xml><?xml version="1.0" encoding="utf-8"?>
+<p:notes xmlns:a="http://schemas.openxmlformats.org/drawingml/2006/main" xmlns:r="http://schemas.openxmlformats.org/officeDocument/2006/relationships" xmlns:p="http://schemas.openxmlformats.org/presentationml/2006/main">
+  <p:cSld>
+    <p:spTree>
+      <p:nvGrpSpPr>
+        <p:cNvPr id="1" name=""/>
+        <p:cNvGrpSpPr/>
+        <p:nvPr/>
+      </p:nvGrpSpPr>
+      <p:grpSpPr>
+        <a:xfrm>
+          <a:off x="0" y="0"/>
+          <a:ext cx="0" cy="0"/>
+          <a:chOff x="0" y="0"/>
+          <a:chExt cx="0" cy="0"/>
+        </a:xfrm>
+      </p:grpSpPr>
+      <p:sp>
+        <p:nvSpPr>
+          <p:cNvPr id="2" name="Slide Image Placeholder 1"/>
+          <p:cNvSpPr>
+            <a:spLocks noGrp="1" noRot="1" noChangeAspect="1"/>
+          </p:cNvSpPr>
+          <p:nvPr>
+            <p:ph type="sldImg"/>
+          </p:nvPr>
+        </p:nvSpPr>
+        <p:spPr/>
+      </p:sp>
+      <p:sp>
+        <p:nvSpPr>
+          <p:cNvPr id="3" name="Notes Placeholder 2"/>
+          <p:cNvSpPr>
+            <a:spLocks noGrp="1"/>
+          </p:cNvSpPr>
+          <p:nvPr>
+            <p:ph type="body" idx="1"/>
+          </p:nvPr>
+        </p:nvSpPr>
+        <p:spPr/>
+        <p:txBody>
+          <a:bodyPr/>
+          <a:lstStyle/>
+          <a:p>
+            <a:endParaRPr lang="en-US"/>
+          </a:p>
+        </p:txBody>
+      </p:sp>
+      <p:sp>
+        <p:nvSpPr>
+          <p:cNvPr id="4" name="Slide Number Placeholder 3"/>
+          <p:cNvSpPr>
+            <a:spLocks noGrp="1"/>
+          </p:cNvSpPr>
+          <p:nvPr>
+            <p:ph type="sldNum" sz="quarter" idx="5"/>
+          </p:nvPr>
+        </p:nvSpPr>
+        <p:spPr/>
+        <p:txBody>
+          <a:bodyPr/>
+          <a:lstStyle/>
+          <a:p>
+            <a:fld id="{A6961DC2-A28F-4C81-9966-8D7B3191DD23}" type="slidenum">
+              <a:rPr lang="en-US" smtClean="0"/>
+              <a:t>12</a:t>
+            </a:fld>
+            <a:endParaRPr lang="en-US"/>
+          </a:p>
+        </p:txBody>
+      </p:sp>
+    </p:spTree>
+    <p:extLst>
+      <p:ext uri="{BB962C8B-B14F-4D97-AF65-F5344CB8AC3E}">
+        <p14:creationId xmlns:p14="http://schemas.microsoft.com/office/powerpoint/2010/main" val="381664130"/>
+      </p:ext>
+    </p:extLst>
+  </p:cSld>
+  <p:clrMapOvr>
+    <a:masterClrMapping/>
+  </p:clrMapOvr>
+</p:notes>
+</file>
+
+<file path=ppt/notesSlides/notesSlide13.xml><?xml version="1.0" encoding="utf-8"?>
+<p:notes xmlns:a="http://schemas.openxmlformats.org/drawingml/2006/main" xmlns:r="http://schemas.openxmlformats.org/officeDocument/2006/relationships" xmlns:p="http://schemas.openxmlformats.org/presentationml/2006/main">
+  <p:cSld>
+    <p:spTree>
+      <p:nvGrpSpPr>
+        <p:cNvPr id="1" name=""/>
+        <p:cNvGrpSpPr/>
+        <p:nvPr/>
+      </p:nvGrpSpPr>
+      <p:grpSpPr>
+        <a:xfrm>
+          <a:off x="0" y="0"/>
+          <a:ext cx="0" cy="0"/>
+          <a:chOff x="0" y="0"/>
+          <a:chExt cx="0" cy="0"/>
+        </a:xfrm>
+      </p:grpSpPr>
+      <p:sp>
+        <p:nvSpPr>
+          <p:cNvPr id="2" name="Slide Image Placeholder 1"/>
+          <p:cNvSpPr>
+            <a:spLocks noGrp="1" noRot="1" noChangeAspect="1"/>
+          </p:cNvSpPr>
+          <p:nvPr>
+            <p:ph type="sldImg"/>
+          </p:nvPr>
+        </p:nvSpPr>
+        <p:spPr/>
+      </p:sp>
+      <p:sp>
+        <p:nvSpPr>
+          <p:cNvPr id="3" name="Notes Placeholder 2"/>
+          <p:cNvSpPr>
+            <a:spLocks noGrp="1"/>
+          </p:cNvSpPr>
+          <p:nvPr>
+            <p:ph type="body" idx="1"/>
+          </p:nvPr>
+        </p:nvSpPr>
+        <p:spPr/>
+        <p:txBody>
+          <a:bodyPr/>
+          <a:lstStyle/>
+          <a:p>
+            <a:endParaRPr lang="en-US"/>
+          </a:p>
+        </p:txBody>
+      </p:sp>
+      <p:sp>
+        <p:nvSpPr>
+          <p:cNvPr id="4" name="Slide Number Placeholder 3"/>
+          <p:cNvSpPr>
+            <a:spLocks noGrp="1"/>
+          </p:cNvSpPr>
+          <p:nvPr>
+            <p:ph type="sldNum" sz="quarter" idx="5"/>
+          </p:nvPr>
+        </p:nvSpPr>
+        <p:spPr/>
+        <p:txBody>
+          <a:bodyPr/>
+          <a:lstStyle/>
+          <a:p>
+            <a:fld id="{A6961DC2-A28F-4C81-9966-8D7B3191DD23}" type="slidenum">
+              <a:rPr lang="en-US" smtClean="0"/>
+              <a:t>13</a:t>
+            </a:fld>
+            <a:endParaRPr lang="en-US"/>
+          </a:p>
+        </p:txBody>
+      </p:sp>
+    </p:spTree>
+    <p:extLst>
+      <p:ext uri="{BB962C8B-B14F-4D97-AF65-F5344CB8AC3E}">
+        <p14:creationId xmlns:p14="http://schemas.microsoft.com/office/powerpoint/2010/main" val="499454593"/>
+      </p:ext>
+    </p:extLst>
+  </p:cSld>
+  <p:clrMapOvr>
+    <a:masterClrMapping/>
+  </p:clrMapOvr>
+</p:notes>
+</file>
+
+<file path=ppt/notesSlides/notesSlide14.xml><?xml version="1.0" encoding="utf-8"?>
+<p:notes xmlns:a="http://schemas.openxmlformats.org/drawingml/2006/main" xmlns:r="http://schemas.openxmlformats.org/officeDocument/2006/relationships" xmlns:p="http://schemas.openxmlformats.org/presentationml/2006/main">
+  <p:cSld>
+    <p:spTree>
+      <p:nvGrpSpPr>
+        <p:cNvPr id="1" name=""/>
+        <p:cNvGrpSpPr/>
+        <p:nvPr/>
+      </p:nvGrpSpPr>
+      <p:grpSpPr>
+        <a:xfrm>
+          <a:off x="0" y="0"/>
+          <a:ext cx="0" cy="0"/>
+          <a:chOff x="0" y="0"/>
+          <a:chExt cx="0" cy="0"/>
+        </a:xfrm>
+      </p:grpSpPr>
+      <p:sp>
+        <p:nvSpPr>
+          <p:cNvPr id="2" name="Slide Image Placeholder 1"/>
+          <p:cNvSpPr>
+            <a:spLocks noGrp="1" noRot="1" noChangeAspect="1"/>
+          </p:cNvSpPr>
+          <p:nvPr>
+            <p:ph type="sldImg"/>
+          </p:nvPr>
+        </p:nvSpPr>
+        <p:spPr/>
+      </p:sp>
+      <p:sp>
+        <p:nvSpPr>
+          <p:cNvPr id="3" name="Notes Placeholder 2"/>
+          <p:cNvSpPr>
+            <a:spLocks noGrp="1"/>
+          </p:cNvSpPr>
+          <p:nvPr>
+            <p:ph type="body" idx="1"/>
+          </p:nvPr>
+        </p:nvSpPr>
+        <p:spPr/>
+        <p:txBody>
+          <a:bodyPr/>
+          <a:lstStyle/>
+          <a:p>
+            <a:endParaRPr lang="en-US"/>
+          </a:p>
+        </p:txBody>
+      </p:sp>
+      <p:sp>
+        <p:nvSpPr>
+          <p:cNvPr id="4" name="Slide Number Placeholder 3"/>
+          <p:cNvSpPr>
+            <a:spLocks noGrp="1"/>
+          </p:cNvSpPr>
+          <p:nvPr>
+            <p:ph type="sldNum" sz="quarter" idx="5"/>
+          </p:nvPr>
+        </p:nvSpPr>
+        <p:spPr/>
+        <p:txBody>
+          <a:bodyPr/>
+          <a:lstStyle/>
+          <a:p>
+            <a:fld id="{A6961DC2-A28F-4C81-9966-8D7B3191DD23}" type="slidenum">
+              <a:rPr lang="en-US" smtClean="0"/>
+              <a:t>14</a:t>
+            </a:fld>
+            <a:endParaRPr lang="en-US"/>
+          </a:p>
+        </p:txBody>
+      </p:sp>
+    </p:spTree>
+    <p:extLst>
+      <p:ext uri="{BB962C8B-B14F-4D97-AF65-F5344CB8AC3E}">
+        <p14:creationId xmlns:p14="http://schemas.microsoft.com/office/powerpoint/2010/main" val="3723610557"/>
+      </p:ext>
+    </p:extLst>
+  </p:cSld>
+  <p:clrMapOvr>
+    <a:masterClrMapping/>
+  </p:clrMapOvr>
+</p:notes>
+</file>
+
+<file path=ppt/notesSlides/notesSlide15.xml><?xml version="1.0" encoding="utf-8"?>
+<p:notes xmlns:a="http://schemas.openxmlformats.org/drawingml/2006/main" xmlns:r="http://schemas.openxmlformats.org/officeDocument/2006/relationships" xmlns:p="http://schemas.openxmlformats.org/presentationml/2006/main">
+  <p:cSld>
+    <p:spTree>
+      <p:nvGrpSpPr>
+        <p:cNvPr id="1" name=""/>
+        <p:cNvGrpSpPr/>
+        <p:nvPr/>
+      </p:nvGrpSpPr>
+      <p:grpSpPr>
+        <a:xfrm>
+          <a:off x="0" y="0"/>
+          <a:ext cx="0" cy="0"/>
+          <a:chOff x="0" y="0"/>
+          <a:chExt cx="0" cy="0"/>
+        </a:xfrm>
+      </p:grpSpPr>
+      <p:sp>
+        <p:nvSpPr>
+          <p:cNvPr id="2" name="Slide Image Placeholder 1"/>
+          <p:cNvSpPr>
+            <a:spLocks noGrp="1" noRot="1" noChangeAspect="1"/>
+          </p:cNvSpPr>
+          <p:nvPr>
+            <p:ph type="sldImg"/>
+          </p:nvPr>
+        </p:nvSpPr>
+        <p:spPr/>
+      </p:sp>
+      <p:sp>
+        <p:nvSpPr>
+          <p:cNvPr id="3" name="Notes Placeholder 2"/>
+          <p:cNvSpPr>
+            <a:spLocks noGrp="1"/>
+          </p:cNvSpPr>
+          <p:nvPr>
+            <p:ph type="body" idx="1"/>
+          </p:nvPr>
+        </p:nvSpPr>
+        <p:spPr/>
+        <p:txBody>
+          <a:bodyPr/>
+          <a:lstStyle/>
+          <a:p>
+            <a:endParaRPr lang="en-US"/>
+          </a:p>
+        </p:txBody>
+      </p:sp>
+      <p:sp>
+        <p:nvSpPr>
+          <p:cNvPr id="4" name="Slide Number Placeholder 3"/>
+          <p:cNvSpPr>
+            <a:spLocks noGrp="1"/>
+          </p:cNvSpPr>
+          <p:nvPr>
+            <p:ph type="sldNum" sz="quarter" idx="5"/>
+          </p:nvPr>
+        </p:nvSpPr>
+        <p:spPr/>
+        <p:txBody>
+          <a:bodyPr/>
+          <a:lstStyle/>
+          <a:p>
+            <a:fld id="{A6961DC2-A28F-4C81-9966-8D7B3191DD23}" type="slidenum">
+              <a:rPr lang="en-US" smtClean="0"/>
+              <a:t>15</a:t>
+            </a:fld>
+            <a:endParaRPr lang="en-US"/>
+          </a:p>
+        </p:txBody>
+      </p:sp>
+    </p:spTree>
+    <p:extLst>
+      <p:ext uri="{BB962C8B-B14F-4D97-AF65-F5344CB8AC3E}">
+        <p14:creationId xmlns:p14="http://schemas.microsoft.com/office/powerpoint/2010/main" val="1826812813"/>
+      </p:ext>
+    </p:extLst>
+  </p:cSld>
+  <p:clrMapOvr>
+    <a:masterClrMapping/>
+  </p:clrMapOvr>
+</p:notes>
+</file>
+
+<file path=ppt/notesSlides/notesSlide16.xml><?xml version="1.0" encoding="utf-8"?>
+<p:notes xmlns:a="http://schemas.openxmlformats.org/drawingml/2006/main" xmlns:r="http://schemas.openxmlformats.org/officeDocument/2006/relationships" xmlns:p="http://schemas.openxmlformats.org/presentationml/2006/main">
+  <p:cSld>
+    <p:spTree>
+      <p:nvGrpSpPr>
+        <p:cNvPr id="1" name=""/>
+        <p:cNvGrpSpPr/>
+        <p:nvPr/>
+      </p:nvGrpSpPr>
+      <p:grpSpPr>
+        <a:xfrm>
+          <a:off x="0" y="0"/>
+          <a:ext cx="0" cy="0"/>
+          <a:chOff x="0" y="0"/>
+          <a:chExt cx="0" cy="0"/>
+        </a:xfrm>
+      </p:grpSpPr>
+      <p:sp>
+        <p:nvSpPr>
+          <p:cNvPr id="2" name="Slide Image Placeholder 1"/>
+          <p:cNvSpPr>
+            <a:spLocks noGrp="1" noRot="1" noChangeAspect="1"/>
+          </p:cNvSpPr>
+          <p:nvPr>
+            <p:ph type="sldImg"/>
+          </p:nvPr>
+        </p:nvSpPr>
+        <p:spPr/>
+      </p:sp>
+      <p:sp>
+        <p:nvSpPr>
+          <p:cNvPr id="3" name="Notes Placeholder 2"/>
+          <p:cNvSpPr>
+            <a:spLocks noGrp="1"/>
+          </p:cNvSpPr>
+          <p:nvPr>
+            <p:ph type="body" idx="1"/>
+          </p:nvPr>
+        </p:nvSpPr>
+        <p:spPr/>
+        <p:txBody>
+          <a:bodyPr/>
+          <a:lstStyle/>
+          <a:p>
+            <a:endParaRPr lang="en-US"/>
+          </a:p>
+        </p:txBody>
+      </p:sp>
+      <p:sp>
+        <p:nvSpPr>
+          <p:cNvPr id="4" name="Slide Number Placeholder 3"/>
+          <p:cNvSpPr>
+            <a:spLocks noGrp="1"/>
+          </p:cNvSpPr>
+          <p:nvPr>
+            <p:ph type="sldNum" sz="quarter" idx="5"/>
+          </p:nvPr>
+        </p:nvSpPr>
+        <p:spPr/>
+        <p:txBody>
+          <a:bodyPr/>
+          <a:lstStyle/>
+          <a:p>
+            <a:fld id="{A6961DC2-A28F-4C81-9966-8D7B3191DD23}" type="slidenum">
+              <a:rPr lang="en-US" smtClean="0"/>
+              <a:t>16</a:t>
+            </a:fld>
+            <a:endParaRPr lang="en-US"/>
+          </a:p>
+        </p:txBody>
+      </p:sp>
+    </p:spTree>
+    <p:extLst>
+      <p:ext uri="{BB962C8B-B14F-4D97-AF65-F5344CB8AC3E}">
+        <p14:creationId xmlns:p14="http://schemas.microsoft.com/office/powerpoint/2010/main" val="768873506"/>
+      </p:ext>
+    </p:extLst>
+  </p:cSld>
+  <p:clrMapOvr>
+    <a:masterClrMapping/>
+  </p:clrMapOvr>
+</p:notes>
+</file>
+
+<file path=ppt/notesSlides/notesSlide17.xml><?xml version="1.0" encoding="utf-8"?>
+<p:notes xmlns:a="http://schemas.openxmlformats.org/drawingml/2006/main" xmlns:r="http://schemas.openxmlformats.org/officeDocument/2006/relationships" xmlns:p="http://schemas.openxmlformats.org/presentationml/2006/main">
+  <p:cSld>
+    <p:spTree>
+      <p:nvGrpSpPr>
+        <p:cNvPr id="1" name=""/>
+        <p:cNvGrpSpPr/>
+        <p:nvPr/>
+      </p:nvGrpSpPr>
+      <p:grpSpPr>
+        <a:xfrm>
+          <a:off x="0" y="0"/>
+          <a:ext cx="0" cy="0"/>
+          <a:chOff x="0" y="0"/>
+          <a:chExt cx="0" cy="0"/>
+        </a:xfrm>
+      </p:grpSpPr>
+      <p:sp>
+        <p:nvSpPr>
+          <p:cNvPr id="2" name="Slide Image Placeholder 1"/>
+          <p:cNvSpPr>
+            <a:spLocks noGrp="1" noRot="1" noChangeAspect="1"/>
+          </p:cNvSpPr>
+          <p:nvPr>
+            <p:ph type="sldImg"/>
+          </p:nvPr>
+        </p:nvSpPr>
+        <p:spPr/>
+      </p:sp>
+      <p:sp>
+        <p:nvSpPr>
+          <p:cNvPr id="3" name="Notes Placeholder 2"/>
+          <p:cNvSpPr>
+            <a:spLocks noGrp="1"/>
+          </p:cNvSpPr>
+          <p:nvPr>
+            <p:ph type="body" idx="1"/>
+          </p:nvPr>
+        </p:nvSpPr>
+        <p:spPr/>
+        <p:txBody>
+          <a:bodyPr/>
+          <a:lstStyle/>
+          <a:p>
+            <a:endParaRPr lang="en-US"/>
+          </a:p>
+        </p:txBody>
+      </p:sp>
+      <p:sp>
+        <p:nvSpPr>
+          <p:cNvPr id="4" name="Slide Number Placeholder 3"/>
+          <p:cNvSpPr>
+            <a:spLocks noGrp="1"/>
+          </p:cNvSpPr>
+          <p:nvPr>
+            <p:ph type="sldNum" sz="quarter" idx="5"/>
+          </p:nvPr>
+        </p:nvSpPr>
+        <p:spPr/>
+        <p:txBody>
+          <a:bodyPr/>
+          <a:lstStyle/>
+          <a:p>
+            <a:fld id="{A6961DC2-A28F-4C81-9966-8D7B3191DD23}" type="slidenum">
+              <a:rPr lang="en-US" smtClean="0"/>
+              <a:t>17</a:t>
+            </a:fld>
+            <a:endParaRPr lang="en-US"/>
+          </a:p>
+        </p:txBody>
+      </p:sp>
+    </p:spTree>
+    <p:extLst>
+      <p:ext uri="{BB962C8B-B14F-4D97-AF65-F5344CB8AC3E}">
+        <p14:creationId xmlns:p14="http://schemas.microsoft.com/office/powerpoint/2010/main" val="4223027478"/>
+      </p:ext>
+    </p:extLst>
+  </p:cSld>
+  <p:clrMapOvr>
+    <a:masterClrMapping/>
+  </p:clrMapOvr>
+</p:notes>
+</file>
+
+<file path=ppt/notesSlides/notesSlide18.xml><?xml version="1.0" encoding="utf-8"?>
+<p:notes xmlns:a="http://schemas.openxmlformats.org/drawingml/2006/main" xmlns:r="http://schemas.openxmlformats.org/officeDocument/2006/relationships" xmlns:p="http://schemas.openxmlformats.org/presentationml/2006/main">
+  <p:cSld>
+    <p:spTree>
+      <p:nvGrpSpPr>
+        <p:cNvPr id="1" name=""/>
+        <p:cNvGrpSpPr/>
+        <p:nvPr/>
+      </p:nvGrpSpPr>
+      <p:grpSpPr>
+        <a:xfrm>
+          <a:off x="0" y="0"/>
+          <a:ext cx="0" cy="0"/>
+          <a:chOff x="0" y="0"/>
+          <a:chExt cx="0" cy="0"/>
+        </a:xfrm>
+      </p:grpSpPr>
+      <p:sp>
+        <p:nvSpPr>
+          <p:cNvPr id="2" name="Slide Image Placeholder 1"/>
+          <p:cNvSpPr>
+            <a:spLocks noGrp="1" noRot="1" noChangeAspect="1"/>
+          </p:cNvSpPr>
+          <p:nvPr>
+            <p:ph type="sldImg"/>
+          </p:nvPr>
+        </p:nvSpPr>
+        <p:spPr/>
+      </p:sp>
+      <p:sp>
+        <p:nvSpPr>
+          <p:cNvPr id="3" name="Notes Placeholder 2"/>
+          <p:cNvSpPr>
+            <a:spLocks noGrp="1"/>
+          </p:cNvSpPr>
+          <p:nvPr>
+            <p:ph type="body" idx="1"/>
+          </p:nvPr>
+        </p:nvSpPr>
+        <p:spPr/>
+        <p:txBody>
+          <a:bodyPr/>
+          <a:lstStyle/>
+          <a:p>
+            <a:endParaRPr lang="en-US"/>
+          </a:p>
+        </p:txBody>
+      </p:sp>
+      <p:sp>
+        <p:nvSpPr>
+          <p:cNvPr id="4" name="Slide Number Placeholder 3"/>
+          <p:cNvSpPr>
+            <a:spLocks noGrp="1"/>
+          </p:cNvSpPr>
+          <p:nvPr>
+            <p:ph type="sldNum" sz="quarter" idx="5"/>
+          </p:nvPr>
+        </p:nvSpPr>
+        <p:spPr/>
+        <p:txBody>
+          <a:bodyPr/>
+          <a:lstStyle/>
+          <a:p>
+            <a:fld id="{A6961DC2-A28F-4C81-9966-8D7B3191DD23}" type="slidenum">
+              <a:rPr lang="en-US" smtClean="0"/>
+              <a:t>18</a:t>
+            </a:fld>
+            <a:endParaRPr lang="en-US"/>
+          </a:p>
+        </p:txBody>
+      </p:sp>
+    </p:spTree>
+    <p:extLst>
+      <p:ext uri="{BB962C8B-B14F-4D97-AF65-F5344CB8AC3E}">
+        <p14:creationId xmlns:p14="http://schemas.microsoft.com/office/powerpoint/2010/main" val="2269781368"/>
+      </p:ext>
+    </p:extLst>
+  </p:cSld>
+  <p:clrMapOvr>
+    <a:masterClrMapping/>
+  </p:clrMapOvr>
+</p:notes>
+</file>
+
+<file path=ppt/notesSlides/notesSlide19.xml><?xml version="1.0" encoding="utf-8"?>
+<p:notes xmlns:a="http://schemas.openxmlformats.org/drawingml/2006/main" xmlns:r="http://schemas.openxmlformats.org/officeDocument/2006/relationships" xmlns:p="http://schemas.openxmlformats.org/presentationml/2006/main">
+  <p:cSld>
+    <p:spTree>
+      <p:nvGrpSpPr>
+        <p:cNvPr id="1" name=""/>
+        <p:cNvGrpSpPr/>
+        <p:nvPr/>
+      </p:nvGrpSpPr>
+      <p:grpSpPr>
+        <a:xfrm>
+          <a:off x="0" y="0"/>
+          <a:ext cx="0" cy="0"/>
+          <a:chOff x="0" y="0"/>
+          <a:chExt cx="0" cy="0"/>
+        </a:xfrm>
+      </p:grpSpPr>
+      <p:sp>
+        <p:nvSpPr>
+          <p:cNvPr id="2" name="Slide Image Placeholder 1"/>
+          <p:cNvSpPr>
+            <a:spLocks noGrp="1" noRot="1" noChangeAspect="1"/>
+          </p:cNvSpPr>
+          <p:nvPr>
+            <p:ph type="sldImg"/>
+          </p:nvPr>
+        </p:nvSpPr>
+        <p:spPr/>
+      </p:sp>
+      <p:sp>
+        <p:nvSpPr>
+          <p:cNvPr id="3" name="Notes Placeholder 2"/>
+          <p:cNvSpPr>
+            <a:spLocks noGrp="1"/>
+          </p:cNvSpPr>
+          <p:nvPr>
+            <p:ph type="body" idx="1"/>
+          </p:nvPr>
+        </p:nvSpPr>
+        <p:spPr/>
+        <p:txBody>
+          <a:bodyPr/>
+          <a:lstStyle/>
+          <a:p>
+            <a:endParaRPr lang="en-US"/>
+          </a:p>
+        </p:txBody>
+      </p:sp>
+      <p:sp>
+        <p:nvSpPr>
+          <p:cNvPr id="4" name="Slide Number Placeholder 3"/>
+          <p:cNvSpPr>
+            <a:spLocks noGrp="1"/>
+          </p:cNvSpPr>
+          <p:nvPr>
+            <p:ph type="sldNum" sz="quarter" idx="5"/>
+          </p:nvPr>
+        </p:nvSpPr>
+        <p:spPr/>
+        <p:txBody>
+          <a:bodyPr/>
+          <a:lstStyle/>
+          <a:p>
+            <a:fld id="{A6961DC2-A28F-4C81-9966-8D7B3191DD23}" type="slidenum">
+              <a:rPr lang="en-US" smtClean="0"/>
+              <a:t>19</a:t>
+            </a:fld>
+            <a:endParaRPr lang="en-US"/>
+          </a:p>
+        </p:txBody>
+      </p:sp>
+    </p:spTree>
+    <p:extLst>
+      <p:ext uri="{BB962C8B-B14F-4D97-AF65-F5344CB8AC3E}">
+        <p14:creationId xmlns:p14="http://schemas.microsoft.com/office/powerpoint/2010/main" val="2786957433"/>
+      </p:ext>
+    </p:extLst>
+  </p:cSld>
+  <p:clrMapOvr>
+    <a:masterClrMapping/>
+  </p:clrMapOvr>
+</p:notes>
+</file>
+
+<file path=ppt/notesSlides/notesSlide2.xml><?xml version="1.0" encoding="utf-8"?>
+<p:notes xmlns:a="http://schemas.openxmlformats.org/drawingml/2006/main" xmlns:r="http://schemas.openxmlformats.org/officeDocument/2006/relationships" xmlns:p="http://schemas.openxmlformats.org/presentationml/2006/main">
+  <p:cSld>
+    <p:spTree>
+      <p:nvGrpSpPr>
+        <p:cNvPr id="1" name=""/>
+        <p:cNvGrpSpPr/>
+        <p:nvPr/>
+      </p:nvGrpSpPr>
+      <p:grpSpPr>
+        <a:xfrm>
+          <a:off x="0" y="0"/>
+          <a:ext cx="0" cy="0"/>
+          <a:chOff x="0" y="0"/>
+          <a:chExt cx="0" cy="0"/>
+        </a:xfrm>
+      </p:grpSpPr>
+      <p:sp>
+        <p:nvSpPr>
+          <p:cNvPr id="2" name="Slide Image Placeholder 1"/>
+          <p:cNvSpPr>
+            <a:spLocks noGrp="1" noRot="1" noChangeAspect="1"/>
+          </p:cNvSpPr>
+          <p:nvPr>
+            <p:ph type="sldImg"/>
+          </p:nvPr>
+        </p:nvSpPr>
+        <p:spPr/>
+      </p:sp>
+      <p:sp>
+        <p:nvSpPr>
+          <p:cNvPr id="3" name="Notes Placeholder 2"/>
+          <p:cNvSpPr>
+            <a:spLocks noGrp="1"/>
+          </p:cNvSpPr>
+          <p:nvPr>
+            <p:ph type="body" idx="1"/>
+          </p:nvPr>
+        </p:nvSpPr>
+        <p:spPr/>
+        <p:txBody>
+          <a:bodyPr/>
+          <a:lstStyle/>
+          <a:p>
+            <a:endParaRPr lang="en-US"/>
+          </a:p>
+        </p:txBody>
+      </p:sp>
+      <p:sp>
+        <p:nvSpPr>
+          <p:cNvPr id="4" name="Slide Number Placeholder 3"/>
+          <p:cNvSpPr>
+            <a:spLocks noGrp="1"/>
+          </p:cNvSpPr>
+          <p:nvPr>
+            <p:ph type="sldNum" sz="quarter" idx="5"/>
+          </p:nvPr>
+        </p:nvSpPr>
+        <p:spPr/>
+        <p:txBody>
+          <a:bodyPr/>
+          <a:lstStyle/>
+          <a:p>
+            <a:fld id="{A6961DC2-A28F-4C81-9966-8D7B3191DD23}" type="slidenum">
+              <a:rPr lang="en-US" smtClean="0"/>
+              <a:t>2</a:t>
+            </a:fld>
+            <a:endParaRPr lang="en-US"/>
+          </a:p>
+        </p:txBody>
+      </p:sp>
+    </p:spTree>
+    <p:extLst>
+      <p:ext uri="{BB962C8B-B14F-4D97-AF65-F5344CB8AC3E}">
+        <p14:creationId xmlns:p14="http://schemas.microsoft.com/office/powerpoint/2010/main" val="4264445637"/>
+      </p:ext>
+    </p:extLst>
+  </p:cSld>
+  <p:clrMapOvr>
+    <a:masterClrMapping/>
+  </p:clrMapOvr>
+</p:notes>
+</file>
+
+<file path=ppt/notesSlides/notesSlide20.xml><?xml version="1.0" encoding="utf-8"?>
+<p:notes xmlns:a="http://schemas.openxmlformats.org/drawingml/2006/main" xmlns:r="http://schemas.openxmlformats.org/officeDocument/2006/relationships" xmlns:p="http://schemas.openxmlformats.org/presentationml/2006/main">
+  <p:cSld>
+    <p:spTree>
+      <p:nvGrpSpPr>
+        <p:cNvPr id="1" name=""/>
+        <p:cNvGrpSpPr/>
+        <p:nvPr/>
+      </p:nvGrpSpPr>
+      <p:grpSpPr>
+        <a:xfrm>
+          <a:off x="0" y="0"/>
+          <a:ext cx="0" cy="0"/>
+          <a:chOff x="0" y="0"/>
+          <a:chExt cx="0" cy="0"/>
+        </a:xfrm>
+      </p:grpSpPr>
+      <p:sp>
+        <p:nvSpPr>
+          <p:cNvPr id="2" name="Slide Image Placeholder 1"/>
+          <p:cNvSpPr>
+            <a:spLocks noGrp="1" noRot="1" noChangeAspect="1"/>
+          </p:cNvSpPr>
+          <p:nvPr>
+            <p:ph type="sldImg"/>
+          </p:nvPr>
+        </p:nvSpPr>
+        <p:spPr/>
+      </p:sp>
+      <p:sp>
+        <p:nvSpPr>
+          <p:cNvPr id="3" name="Notes Placeholder 2"/>
+          <p:cNvSpPr>
+            <a:spLocks noGrp="1"/>
+          </p:cNvSpPr>
+          <p:nvPr>
+            <p:ph type="body" idx="1"/>
+          </p:nvPr>
+        </p:nvSpPr>
+        <p:spPr/>
+        <p:txBody>
+          <a:bodyPr/>
+          <a:lstStyle/>
+          <a:p>
+            <a:endParaRPr lang="en-US"/>
+          </a:p>
+        </p:txBody>
+      </p:sp>
+      <p:sp>
+        <p:nvSpPr>
+          <p:cNvPr id="4" name="Slide Number Placeholder 3"/>
+          <p:cNvSpPr>
+            <a:spLocks noGrp="1"/>
+          </p:cNvSpPr>
+          <p:nvPr>
+            <p:ph type="sldNum" sz="quarter" idx="5"/>
+          </p:nvPr>
+        </p:nvSpPr>
+        <p:spPr/>
+        <p:txBody>
+          <a:bodyPr/>
+          <a:lstStyle/>
+          <a:p>
+            <a:fld id="{A6961DC2-A28F-4C81-9966-8D7B3191DD23}" type="slidenum">
+              <a:rPr lang="en-US" smtClean="0"/>
+              <a:t>20</a:t>
+            </a:fld>
+            <a:endParaRPr lang="en-US"/>
+          </a:p>
+        </p:txBody>
+      </p:sp>
+    </p:spTree>
+    <p:extLst>
+      <p:ext uri="{BB962C8B-B14F-4D97-AF65-F5344CB8AC3E}">
+        <p14:creationId xmlns:p14="http://schemas.microsoft.com/office/powerpoint/2010/main" val="2831163324"/>
+      </p:ext>
+    </p:extLst>
+  </p:cSld>
+  <p:clrMapOvr>
+    <a:masterClrMapping/>
+  </p:clrMapOvr>
+</p:notes>
+</file>
+
+<file path=ppt/notesSlides/notesSlide21.xml><?xml version="1.0" encoding="utf-8"?>
+<p:notes xmlns:a="http://schemas.openxmlformats.org/drawingml/2006/main" xmlns:r="http://schemas.openxmlformats.org/officeDocument/2006/relationships" xmlns:p="http://schemas.openxmlformats.org/presentationml/2006/main">
+  <p:cSld>
+    <p:spTree>
+      <p:nvGrpSpPr>
+        <p:cNvPr id="1" name=""/>
+        <p:cNvGrpSpPr/>
+        <p:nvPr/>
+      </p:nvGrpSpPr>
+      <p:grpSpPr>
+        <a:xfrm>
+          <a:off x="0" y="0"/>
+          <a:ext cx="0" cy="0"/>
+          <a:chOff x="0" y="0"/>
+          <a:chExt cx="0" cy="0"/>
+        </a:xfrm>
+      </p:grpSpPr>
+      <p:sp>
+        <p:nvSpPr>
+          <p:cNvPr id="2" name="Slide Image Placeholder 1"/>
+          <p:cNvSpPr>
+            <a:spLocks noGrp="1" noRot="1" noChangeAspect="1"/>
+          </p:cNvSpPr>
+          <p:nvPr>
+            <p:ph type="sldImg"/>
+          </p:nvPr>
+        </p:nvSpPr>
+        <p:spPr/>
+      </p:sp>
+      <p:sp>
+        <p:nvSpPr>
+          <p:cNvPr id="3" name="Notes Placeholder 2"/>
+          <p:cNvSpPr>
+            <a:spLocks noGrp="1"/>
+          </p:cNvSpPr>
+          <p:nvPr>
+            <p:ph type="body" idx="1"/>
+          </p:nvPr>
+        </p:nvSpPr>
+        <p:spPr/>
+        <p:txBody>
+          <a:bodyPr/>
+          <a:lstStyle/>
+          <a:p>
+            <a:endParaRPr lang="en-US"/>
+          </a:p>
+        </p:txBody>
+      </p:sp>
+      <p:sp>
+        <p:nvSpPr>
+          <p:cNvPr id="4" name="Slide Number Placeholder 3"/>
+          <p:cNvSpPr>
+            <a:spLocks noGrp="1"/>
+          </p:cNvSpPr>
+          <p:nvPr>
+            <p:ph type="sldNum" sz="quarter" idx="5"/>
+          </p:nvPr>
+        </p:nvSpPr>
+        <p:spPr/>
+        <p:txBody>
+          <a:bodyPr/>
+          <a:lstStyle/>
+          <a:p>
+            <a:fld id="{A6961DC2-A28F-4C81-9966-8D7B3191DD23}" type="slidenum">
+              <a:rPr lang="en-US" smtClean="0"/>
+              <a:t>21</a:t>
+            </a:fld>
+            <a:endParaRPr lang="en-US"/>
+          </a:p>
+        </p:txBody>
+      </p:sp>
+    </p:spTree>
+    <p:extLst>
+      <p:ext uri="{BB962C8B-B14F-4D97-AF65-F5344CB8AC3E}">
+        <p14:creationId xmlns:p14="http://schemas.microsoft.com/office/powerpoint/2010/main" val="1344368945"/>
+      </p:ext>
+    </p:extLst>
+  </p:cSld>
+  <p:clrMapOvr>
+    <a:masterClrMapping/>
+  </p:clrMapOvr>
+</p:notes>
+</file>
+
+<file path=ppt/notesSlides/notesSlide22.xml><?xml version="1.0" encoding="utf-8"?>
+<p:notes xmlns:a="http://schemas.openxmlformats.org/drawingml/2006/main" xmlns:r="http://schemas.openxmlformats.org/officeDocument/2006/relationships" xmlns:p="http://schemas.openxmlformats.org/presentationml/2006/main">
+  <p:cSld>
+    <p:spTree>
+      <p:nvGrpSpPr>
+        <p:cNvPr id="1" name=""/>
+        <p:cNvGrpSpPr/>
+        <p:nvPr/>
+      </p:nvGrpSpPr>
+      <p:grpSpPr>
+        <a:xfrm>
+          <a:off x="0" y="0"/>
+          <a:ext cx="0" cy="0"/>
+          <a:chOff x="0" y="0"/>
+          <a:chExt cx="0" cy="0"/>
+        </a:xfrm>
+      </p:grpSpPr>
+      <p:sp>
+        <p:nvSpPr>
+          <p:cNvPr id="2" name="Slide Image Placeholder 1"/>
+          <p:cNvSpPr>
+            <a:spLocks noGrp="1" noRot="1" noChangeAspect="1"/>
+          </p:cNvSpPr>
+          <p:nvPr>
+            <p:ph type="sldImg"/>
+          </p:nvPr>
+        </p:nvSpPr>
+        <p:spPr/>
+      </p:sp>
+      <p:sp>
+        <p:nvSpPr>
+          <p:cNvPr id="3" name="Notes Placeholder 2"/>
+          <p:cNvSpPr>
+            <a:spLocks noGrp="1"/>
+          </p:cNvSpPr>
+          <p:nvPr>
+            <p:ph type="body" idx="1"/>
+          </p:nvPr>
+        </p:nvSpPr>
+        <p:spPr/>
+        <p:txBody>
+          <a:bodyPr/>
+          <a:lstStyle/>
+          <a:p>
+            <a:endParaRPr lang="en-US"/>
+          </a:p>
+        </p:txBody>
+      </p:sp>
+      <p:sp>
+        <p:nvSpPr>
+          <p:cNvPr id="4" name="Slide Number Placeholder 3"/>
+          <p:cNvSpPr>
+            <a:spLocks noGrp="1"/>
+          </p:cNvSpPr>
+          <p:nvPr>
+            <p:ph type="sldNum" sz="quarter" idx="5"/>
+          </p:nvPr>
+        </p:nvSpPr>
+        <p:spPr/>
+        <p:txBody>
+          <a:bodyPr/>
+          <a:lstStyle/>
+          <a:p>
+            <a:fld id="{A6961DC2-A28F-4C81-9966-8D7B3191DD23}" type="slidenum">
+              <a:rPr lang="en-US" smtClean="0"/>
+              <a:t>22</a:t>
+            </a:fld>
+            <a:endParaRPr lang="en-US"/>
+          </a:p>
+        </p:txBody>
+      </p:sp>
+    </p:spTree>
+    <p:extLst>
+      <p:ext uri="{BB962C8B-B14F-4D97-AF65-F5344CB8AC3E}">
+        <p14:creationId xmlns:p14="http://schemas.microsoft.com/office/powerpoint/2010/main" val="1929550757"/>
+      </p:ext>
+    </p:extLst>
+  </p:cSld>
+  <p:clrMapOvr>
+    <a:masterClrMapping/>
+  </p:clrMapOvr>
+</p:notes>
+</file>
+
+<file path=ppt/notesSlides/notesSlide23.xml><?xml version="1.0" encoding="utf-8"?>
+<p:notes xmlns:a="http://schemas.openxmlformats.org/drawingml/2006/main" xmlns:r="http://schemas.openxmlformats.org/officeDocument/2006/relationships" xmlns:p="http://schemas.openxmlformats.org/presentationml/2006/main">
+  <p:cSld>
+    <p:spTree>
+      <p:nvGrpSpPr>
+        <p:cNvPr id="1" name=""/>
+        <p:cNvGrpSpPr/>
+        <p:nvPr/>
+      </p:nvGrpSpPr>
+      <p:grpSpPr>
+        <a:xfrm>
+          <a:off x="0" y="0"/>
+          <a:ext cx="0" cy="0"/>
+          <a:chOff x="0" y="0"/>
+          <a:chExt cx="0" cy="0"/>
+        </a:xfrm>
+      </p:grpSpPr>
+      <p:sp>
+        <p:nvSpPr>
+          <p:cNvPr id="2" name="Slide Image Placeholder 1"/>
+          <p:cNvSpPr>
+            <a:spLocks noGrp="1" noRot="1" noChangeAspect="1"/>
+          </p:cNvSpPr>
+          <p:nvPr>
+            <p:ph type="sldImg"/>
+          </p:nvPr>
+        </p:nvSpPr>
+        <p:spPr/>
+      </p:sp>
+      <p:sp>
+        <p:nvSpPr>
+          <p:cNvPr id="3" name="Notes Placeholder 2"/>
+          <p:cNvSpPr>
+            <a:spLocks noGrp="1"/>
+          </p:cNvSpPr>
+          <p:nvPr>
+            <p:ph type="body" idx="1"/>
+          </p:nvPr>
+        </p:nvSpPr>
+        <p:spPr/>
+        <p:txBody>
+          <a:bodyPr/>
+          <a:lstStyle/>
+          <a:p>
+            <a:endParaRPr lang="en-US"/>
+          </a:p>
+        </p:txBody>
+      </p:sp>
+      <p:sp>
+        <p:nvSpPr>
+          <p:cNvPr id="4" name="Slide Number Placeholder 3"/>
+          <p:cNvSpPr>
+            <a:spLocks noGrp="1"/>
+          </p:cNvSpPr>
+          <p:nvPr>
+            <p:ph type="sldNum" sz="quarter" idx="5"/>
+          </p:nvPr>
+        </p:nvSpPr>
+        <p:spPr/>
+        <p:txBody>
+          <a:bodyPr/>
+          <a:lstStyle/>
+          <a:p>
+            <a:fld id="{A6961DC2-A28F-4C81-9966-8D7B3191DD23}" type="slidenum">
+              <a:rPr lang="en-US" smtClean="0"/>
+              <a:t>23</a:t>
+            </a:fld>
+            <a:endParaRPr lang="en-US"/>
+          </a:p>
+        </p:txBody>
+      </p:sp>
+    </p:spTree>
+    <p:extLst>
+      <p:ext uri="{BB962C8B-B14F-4D97-AF65-F5344CB8AC3E}">
+        <p14:creationId xmlns:p14="http://schemas.microsoft.com/office/powerpoint/2010/main" val="372704466"/>
+      </p:ext>
+    </p:extLst>
+  </p:cSld>
+  <p:clrMapOvr>
+    <a:masterClrMapping/>
+  </p:clrMapOvr>
+</p:notes>
+</file>
+
+<file path=ppt/notesSlides/notesSlide24.xml><?xml version="1.0" encoding="utf-8"?>
+<p:notes xmlns:a="http://schemas.openxmlformats.org/drawingml/2006/main" xmlns:r="http://schemas.openxmlformats.org/officeDocument/2006/relationships" xmlns:p="http://schemas.openxmlformats.org/presentationml/2006/main">
+  <p:cSld>
+    <p:spTree>
+      <p:nvGrpSpPr>
+        <p:cNvPr id="1" name=""/>
+        <p:cNvGrpSpPr/>
+        <p:nvPr/>
+      </p:nvGrpSpPr>
+      <p:grpSpPr>
+        <a:xfrm>
+          <a:off x="0" y="0"/>
+          <a:ext cx="0" cy="0"/>
+          <a:chOff x="0" y="0"/>
+          <a:chExt cx="0" cy="0"/>
+        </a:xfrm>
+      </p:grpSpPr>
+      <p:sp>
+        <p:nvSpPr>
+          <p:cNvPr id="2" name="Slide Image Placeholder 1"/>
+          <p:cNvSpPr>
+            <a:spLocks noGrp="1" noRot="1" noChangeAspect="1"/>
+          </p:cNvSpPr>
+          <p:nvPr>
+            <p:ph type="sldImg"/>
+          </p:nvPr>
+        </p:nvSpPr>
+        <p:spPr/>
+      </p:sp>
+      <p:sp>
+        <p:nvSpPr>
+          <p:cNvPr id="3" name="Notes Placeholder 2"/>
+          <p:cNvSpPr>
+            <a:spLocks noGrp="1"/>
+          </p:cNvSpPr>
+          <p:nvPr>
+            <p:ph type="body" idx="1"/>
+          </p:nvPr>
+        </p:nvSpPr>
+        <p:spPr/>
+        <p:txBody>
+          <a:bodyPr/>
+          <a:lstStyle/>
+          <a:p>
+            <a:endParaRPr lang="en-US"/>
+          </a:p>
+        </p:txBody>
+      </p:sp>
+      <p:sp>
+        <p:nvSpPr>
+          <p:cNvPr id="4" name="Slide Number Placeholder 3"/>
+          <p:cNvSpPr>
+            <a:spLocks noGrp="1"/>
+          </p:cNvSpPr>
+          <p:nvPr>
+            <p:ph type="sldNum" sz="quarter" idx="5"/>
+          </p:nvPr>
+        </p:nvSpPr>
+        <p:spPr/>
+        <p:txBody>
+          <a:bodyPr/>
+          <a:lstStyle/>
+          <a:p>
+            <a:fld id="{A6961DC2-A28F-4C81-9966-8D7B3191DD23}" type="slidenum">
+              <a:rPr lang="en-US" smtClean="0"/>
+              <a:t>24</a:t>
+            </a:fld>
+            <a:endParaRPr lang="en-US"/>
+          </a:p>
+        </p:txBody>
+      </p:sp>
+    </p:spTree>
+    <p:extLst>
+      <p:ext uri="{BB962C8B-B14F-4D97-AF65-F5344CB8AC3E}">
+        <p14:creationId xmlns:p14="http://schemas.microsoft.com/office/powerpoint/2010/main" val="1186160142"/>
+      </p:ext>
+    </p:extLst>
+  </p:cSld>
+  <p:clrMapOvr>
+    <a:masterClrMapping/>
+  </p:clrMapOvr>
+</p:notes>
+</file>
+
+<file path=ppt/notesSlides/notesSlide25.xml><?xml version="1.0" encoding="utf-8"?>
+<p:notes xmlns:a="http://schemas.openxmlformats.org/drawingml/2006/main" xmlns:r="http://schemas.openxmlformats.org/officeDocument/2006/relationships" xmlns:p="http://schemas.openxmlformats.org/presentationml/2006/main">
+  <p:cSld>
+    <p:spTree>
+      <p:nvGrpSpPr>
+        <p:cNvPr id="1" name=""/>
+        <p:cNvGrpSpPr/>
+        <p:nvPr/>
+      </p:nvGrpSpPr>
+      <p:grpSpPr>
+        <a:xfrm>
+          <a:off x="0" y="0"/>
+          <a:ext cx="0" cy="0"/>
+          <a:chOff x="0" y="0"/>
+          <a:chExt cx="0" cy="0"/>
+        </a:xfrm>
+      </p:grpSpPr>
+      <p:sp>
+        <p:nvSpPr>
+          <p:cNvPr id="2" name="Slide Image Placeholder 1"/>
+          <p:cNvSpPr>
+            <a:spLocks noGrp="1" noRot="1" noChangeAspect="1"/>
+          </p:cNvSpPr>
+          <p:nvPr>
+            <p:ph type="sldImg"/>
+          </p:nvPr>
+        </p:nvSpPr>
+        <p:spPr/>
+      </p:sp>
+      <p:sp>
+        <p:nvSpPr>
+          <p:cNvPr id="3" name="Notes Placeholder 2"/>
+          <p:cNvSpPr>
+            <a:spLocks noGrp="1"/>
+          </p:cNvSpPr>
+          <p:nvPr>
+            <p:ph type="body" idx="1"/>
+          </p:nvPr>
+        </p:nvSpPr>
+        <p:spPr/>
+        <p:txBody>
+          <a:bodyPr/>
+          <a:lstStyle/>
+          <a:p>
+            <a:endParaRPr lang="en-US"/>
+          </a:p>
+        </p:txBody>
+      </p:sp>
+      <p:sp>
+        <p:nvSpPr>
+          <p:cNvPr id="4" name="Slide Number Placeholder 3"/>
+          <p:cNvSpPr>
+            <a:spLocks noGrp="1"/>
+          </p:cNvSpPr>
+          <p:nvPr>
+            <p:ph type="sldNum" sz="quarter" idx="5"/>
+          </p:nvPr>
+        </p:nvSpPr>
+        <p:spPr/>
+        <p:txBody>
+          <a:bodyPr/>
+          <a:lstStyle/>
+          <a:p>
+            <a:fld id="{A6961DC2-A28F-4C81-9966-8D7B3191DD23}" type="slidenum">
+              <a:rPr lang="en-US" smtClean="0"/>
+              <a:t>25</a:t>
+            </a:fld>
+            <a:endParaRPr lang="en-US"/>
+          </a:p>
+        </p:txBody>
+      </p:sp>
+    </p:spTree>
+    <p:extLst>
+      <p:ext uri="{BB962C8B-B14F-4D97-AF65-F5344CB8AC3E}">
+        <p14:creationId xmlns:p14="http://schemas.microsoft.com/office/powerpoint/2010/main" val="2727298251"/>
+      </p:ext>
+    </p:extLst>
+  </p:cSld>
+  <p:clrMapOvr>
+    <a:masterClrMapping/>
+  </p:clrMapOvr>
+</p:notes>
+</file>
+
+<file path=ppt/notesSlides/notesSlide26.xml><?xml version="1.0" encoding="utf-8"?>
+<p:notes xmlns:a="http://schemas.openxmlformats.org/drawingml/2006/main" xmlns:r="http://schemas.openxmlformats.org/officeDocument/2006/relationships" xmlns:p="http://schemas.openxmlformats.org/presentationml/2006/main">
+  <p:cSld>
+    <p:spTree>
+      <p:nvGrpSpPr>
+        <p:cNvPr id="1" name=""/>
+        <p:cNvGrpSpPr/>
+        <p:nvPr/>
+      </p:nvGrpSpPr>
+      <p:grpSpPr>
+        <a:xfrm>
+          <a:off x="0" y="0"/>
+          <a:ext cx="0" cy="0"/>
+          <a:chOff x="0" y="0"/>
+          <a:chExt cx="0" cy="0"/>
+        </a:xfrm>
+      </p:grpSpPr>
+      <p:sp>
+        <p:nvSpPr>
+          <p:cNvPr id="2" name="Slide Image Placeholder 1"/>
+          <p:cNvSpPr>
+            <a:spLocks noGrp="1" noRot="1" noChangeAspect="1"/>
+          </p:cNvSpPr>
+          <p:nvPr>
+            <p:ph type="sldImg"/>
+          </p:nvPr>
+        </p:nvSpPr>
+        <p:spPr/>
+      </p:sp>
+      <p:sp>
+        <p:nvSpPr>
+          <p:cNvPr id="3" name="Notes Placeholder 2"/>
+          <p:cNvSpPr>
+            <a:spLocks noGrp="1"/>
+          </p:cNvSpPr>
+          <p:nvPr>
+            <p:ph type="body" idx="1"/>
+          </p:nvPr>
+        </p:nvSpPr>
+        <p:spPr/>
+        <p:txBody>
+          <a:bodyPr/>
+          <a:lstStyle/>
+          <a:p>
+            <a:endParaRPr lang="en-US"/>
+          </a:p>
+        </p:txBody>
+      </p:sp>
+      <p:sp>
+        <p:nvSpPr>
+          <p:cNvPr id="4" name="Slide Number Placeholder 3"/>
+          <p:cNvSpPr>
+            <a:spLocks noGrp="1"/>
+          </p:cNvSpPr>
+          <p:nvPr>
+            <p:ph type="sldNum" sz="quarter" idx="5"/>
+          </p:nvPr>
+        </p:nvSpPr>
+        <p:spPr/>
+        <p:txBody>
+          <a:bodyPr/>
+          <a:lstStyle/>
+          <a:p>
+            <a:fld id="{A6961DC2-A28F-4C81-9966-8D7B3191DD23}" type="slidenum">
+              <a:rPr lang="en-US" smtClean="0"/>
+              <a:t>26</a:t>
+            </a:fld>
+            <a:endParaRPr lang="en-US"/>
+          </a:p>
+        </p:txBody>
+      </p:sp>
+    </p:spTree>
+    <p:extLst>
+      <p:ext uri="{BB962C8B-B14F-4D97-AF65-F5344CB8AC3E}">
+        <p14:creationId xmlns:p14="http://schemas.microsoft.com/office/powerpoint/2010/main" val="1803155280"/>
+      </p:ext>
+    </p:extLst>
+  </p:cSld>
+  <p:clrMapOvr>
+    <a:masterClrMapping/>
+  </p:clrMapOvr>
+</p:notes>
+</file>
+
+<file path=ppt/notesSlides/notesSlide27.xml><?xml version="1.0" encoding="utf-8"?>
+<p:notes xmlns:a="http://schemas.openxmlformats.org/drawingml/2006/main" xmlns:r="http://schemas.openxmlformats.org/officeDocument/2006/relationships" xmlns:p="http://schemas.openxmlformats.org/presentationml/2006/main">
+  <p:cSld>
+    <p:spTree>
+      <p:nvGrpSpPr>
+        <p:cNvPr id="1" name=""/>
+        <p:cNvGrpSpPr/>
+        <p:nvPr/>
+      </p:nvGrpSpPr>
+      <p:grpSpPr>
+        <a:xfrm>
+          <a:off x="0" y="0"/>
+          <a:ext cx="0" cy="0"/>
+          <a:chOff x="0" y="0"/>
+          <a:chExt cx="0" cy="0"/>
+        </a:xfrm>
+      </p:grpSpPr>
+      <p:sp>
+        <p:nvSpPr>
+          <p:cNvPr id="2" name="Slide Image Placeholder 1"/>
+          <p:cNvSpPr>
+            <a:spLocks noGrp="1" noRot="1" noChangeAspect="1"/>
+          </p:cNvSpPr>
+          <p:nvPr>
+            <p:ph type="sldImg"/>
+          </p:nvPr>
+        </p:nvSpPr>
+        <p:spPr/>
+      </p:sp>
+      <p:sp>
+        <p:nvSpPr>
+          <p:cNvPr id="3" name="Notes Placeholder 2"/>
+          <p:cNvSpPr>
+            <a:spLocks noGrp="1"/>
+          </p:cNvSpPr>
+          <p:nvPr>
+            <p:ph type="body" idx="1"/>
+          </p:nvPr>
+        </p:nvSpPr>
+        <p:spPr/>
+        <p:txBody>
+          <a:bodyPr/>
+          <a:lstStyle/>
+          <a:p>
+            <a:endParaRPr lang="en-US"/>
+          </a:p>
+        </p:txBody>
+      </p:sp>
+      <p:sp>
+        <p:nvSpPr>
+          <p:cNvPr id="4" name="Slide Number Placeholder 3"/>
+          <p:cNvSpPr>
+            <a:spLocks noGrp="1"/>
+          </p:cNvSpPr>
+          <p:nvPr>
+            <p:ph type="sldNum" sz="quarter" idx="5"/>
+          </p:nvPr>
+        </p:nvSpPr>
+        <p:spPr/>
+        <p:txBody>
+          <a:bodyPr/>
+          <a:lstStyle/>
+          <a:p>
+            <a:fld id="{A6961DC2-A28F-4C81-9966-8D7B3191DD23}" type="slidenum">
+              <a:rPr lang="en-US" smtClean="0"/>
+              <a:t>27</a:t>
+            </a:fld>
+            <a:endParaRPr lang="en-US"/>
+          </a:p>
+        </p:txBody>
+      </p:sp>
+    </p:spTree>
+    <p:extLst>
+      <p:ext uri="{BB962C8B-B14F-4D97-AF65-F5344CB8AC3E}">
+        <p14:creationId xmlns:p14="http://schemas.microsoft.com/office/powerpoint/2010/main" val="4106854482"/>
+      </p:ext>
+    </p:extLst>
+  </p:cSld>
+  <p:clrMapOvr>
+    <a:masterClrMapping/>
+  </p:clrMapOvr>
+</p:notes>
+</file>
+
+<file path=ppt/notesSlides/notesSlide28.xml><?xml version="1.0" encoding="utf-8"?>
+<p:notes xmlns:a="http://schemas.openxmlformats.org/drawingml/2006/main" xmlns:r="http://schemas.openxmlformats.org/officeDocument/2006/relationships" xmlns:p="http://schemas.openxmlformats.org/presentationml/2006/main">
+  <p:cSld>
+    <p:spTree>
+      <p:nvGrpSpPr>
+        <p:cNvPr id="1" name=""/>
+        <p:cNvGrpSpPr/>
+        <p:nvPr/>
+      </p:nvGrpSpPr>
+      <p:grpSpPr>
+        <a:xfrm>
+          <a:off x="0" y="0"/>
+          <a:ext cx="0" cy="0"/>
+          <a:chOff x="0" y="0"/>
+          <a:chExt cx="0" cy="0"/>
+        </a:xfrm>
+      </p:grpSpPr>
+      <p:sp>
+        <p:nvSpPr>
+          <p:cNvPr id="2" name="Slide Image Placeholder 1"/>
+          <p:cNvSpPr>
+            <a:spLocks noGrp="1" noRot="1" noChangeAspect="1"/>
+          </p:cNvSpPr>
+          <p:nvPr>
+            <p:ph type="sldImg"/>
+          </p:nvPr>
+        </p:nvSpPr>
+        <p:spPr/>
+      </p:sp>
+      <p:sp>
+        <p:nvSpPr>
+          <p:cNvPr id="3" name="Notes Placeholder 2"/>
+          <p:cNvSpPr>
+            <a:spLocks noGrp="1"/>
+          </p:cNvSpPr>
+          <p:nvPr>
+            <p:ph type="body" idx="1"/>
+          </p:nvPr>
+        </p:nvSpPr>
+        <p:spPr/>
+        <p:txBody>
+          <a:bodyPr/>
+          <a:lstStyle/>
+          <a:p>
+            <a:endParaRPr lang="en-US"/>
+          </a:p>
+        </p:txBody>
+      </p:sp>
+      <p:sp>
+        <p:nvSpPr>
+          <p:cNvPr id="4" name="Slide Number Placeholder 3"/>
+          <p:cNvSpPr>
+            <a:spLocks noGrp="1"/>
+          </p:cNvSpPr>
+          <p:nvPr>
+            <p:ph type="sldNum" sz="quarter" idx="5"/>
+          </p:nvPr>
+        </p:nvSpPr>
+        <p:spPr/>
+        <p:txBody>
+          <a:bodyPr/>
+          <a:lstStyle/>
+          <a:p>
+            <a:fld id="{A6961DC2-A28F-4C81-9966-8D7B3191DD23}" type="slidenum">
+              <a:rPr lang="en-US" smtClean="0"/>
+              <a:t>28</a:t>
+            </a:fld>
+            <a:endParaRPr lang="en-US"/>
+          </a:p>
+        </p:txBody>
+      </p:sp>
+    </p:spTree>
+    <p:extLst>
+      <p:ext uri="{BB962C8B-B14F-4D97-AF65-F5344CB8AC3E}">
+        <p14:creationId xmlns:p14="http://schemas.microsoft.com/office/powerpoint/2010/main" val="1993579691"/>
+      </p:ext>
+    </p:extLst>
+  </p:cSld>
+  <p:clrMapOvr>
+    <a:masterClrMapping/>
+  </p:clrMapOvr>
+</p:notes>
+</file>
+
+<file path=ppt/notesSlides/notesSlide3.xml><?xml version="1.0" encoding="utf-8"?>
+<p:notes xmlns:a="http://schemas.openxmlformats.org/drawingml/2006/main" xmlns:r="http://schemas.openxmlformats.org/officeDocument/2006/relationships" xmlns:p="http://schemas.openxmlformats.org/presentationml/2006/main">
+  <p:cSld>
+    <p:spTree>
+      <p:nvGrpSpPr>
+        <p:cNvPr id="1" name=""/>
+        <p:cNvGrpSpPr/>
+        <p:nvPr/>
+      </p:nvGrpSpPr>
+      <p:grpSpPr>
+        <a:xfrm>
+          <a:off x="0" y="0"/>
+          <a:ext cx="0" cy="0"/>
+          <a:chOff x="0" y="0"/>
+          <a:chExt cx="0" cy="0"/>
+        </a:xfrm>
+      </p:grpSpPr>
+      <p:sp>
+        <p:nvSpPr>
+          <p:cNvPr id="2" name="Slide Image Placeholder 1"/>
+          <p:cNvSpPr>
+            <a:spLocks noGrp="1" noRot="1" noChangeAspect="1"/>
+          </p:cNvSpPr>
+          <p:nvPr>
+            <p:ph type="sldImg"/>
+          </p:nvPr>
+        </p:nvSpPr>
+        <p:spPr/>
+      </p:sp>
+      <p:sp>
+        <p:nvSpPr>
+          <p:cNvPr id="3" name="Notes Placeholder 2"/>
+          <p:cNvSpPr>
+            <a:spLocks noGrp="1"/>
+          </p:cNvSpPr>
+          <p:nvPr>
+            <p:ph type="body" idx="1"/>
+          </p:nvPr>
+        </p:nvSpPr>
+        <p:spPr/>
+        <p:txBody>
+          <a:bodyPr/>
+          <a:lstStyle/>
+          <a:p>
+            <a:endParaRPr lang="en-US"/>
+          </a:p>
+        </p:txBody>
+      </p:sp>
+      <p:sp>
+        <p:nvSpPr>
+          <p:cNvPr id="4" name="Slide Number Placeholder 3"/>
+          <p:cNvSpPr>
+            <a:spLocks noGrp="1"/>
+          </p:cNvSpPr>
+          <p:nvPr>
+            <p:ph type="sldNum" sz="quarter" idx="5"/>
+          </p:nvPr>
+        </p:nvSpPr>
+        <p:spPr/>
+        <p:txBody>
+          <a:bodyPr/>
+          <a:lstStyle/>
+          <a:p>
+            <a:fld id="{A6961DC2-A28F-4C81-9966-8D7B3191DD23}" type="slidenum">
+              <a:rPr lang="en-US" smtClean="0"/>
+              <a:t>3</a:t>
+            </a:fld>
+            <a:endParaRPr lang="en-US"/>
+          </a:p>
+        </p:txBody>
+      </p:sp>
+    </p:spTree>
+    <p:extLst>
+      <p:ext uri="{BB962C8B-B14F-4D97-AF65-F5344CB8AC3E}">
+        <p14:creationId xmlns:p14="http://schemas.microsoft.com/office/powerpoint/2010/main" val="2178935647"/>
+      </p:ext>
+    </p:extLst>
+  </p:cSld>
+  <p:clrMapOvr>
+    <a:masterClrMapping/>
+  </p:clrMapOvr>
+</p:notes>
+</file>
+
+<file path=ppt/notesSlides/notesSlide4.xml><?xml version="1.0" encoding="utf-8"?>
+<p:notes xmlns:a="http://schemas.openxmlformats.org/drawingml/2006/main" xmlns:r="http://schemas.openxmlformats.org/officeDocument/2006/relationships" xmlns:p="http://schemas.openxmlformats.org/presentationml/2006/main">
+  <p:cSld>
+    <p:spTree>
+      <p:nvGrpSpPr>
+        <p:cNvPr id="1" name=""/>
+        <p:cNvGrpSpPr/>
+        <p:nvPr/>
+      </p:nvGrpSpPr>
+      <p:grpSpPr>
+        <a:xfrm>
+          <a:off x="0" y="0"/>
+          <a:ext cx="0" cy="0"/>
+          <a:chOff x="0" y="0"/>
+          <a:chExt cx="0" cy="0"/>
+        </a:xfrm>
+      </p:grpSpPr>
+      <p:sp>
+        <p:nvSpPr>
+          <p:cNvPr id="2" name="Slide Image Placeholder 1"/>
+          <p:cNvSpPr>
+            <a:spLocks noGrp="1" noRot="1" noChangeAspect="1"/>
+          </p:cNvSpPr>
+          <p:nvPr>
+            <p:ph type="sldImg"/>
+          </p:nvPr>
+        </p:nvSpPr>
+        <p:spPr/>
+      </p:sp>
+      <p:sp>
+        <p:nvSpPr>
+          <p:cNvPr id="3" name="Notes Placeholder 2"/>
+          <p:cNvSpPr>
+            <a:spLocks noGrp="1"/>
+          </p:cNvSpPr>
+          <p:nvPr>
+            <p:ph type="body" idx="1"/>
+          </p:nvPr>
+        </p:nvSpPr>
+        <p:spPr/>
+        <p:txBody>
+          <a:bodyPr/>
+          <a:lstStyle/>
+          <a:p>
+            <a:endParaRPr lang="en-US"/>
+          </a:p>
+        </p:txBody>
+      </p:sp>
+      <p:sp>
+        <p:nvSpPr>
+          <p:cNvPr id="4" name="Slide Number Placeholder 3"/>
+          <p:cNvSpPr>
+            <a:spLocks noGrp="1"/>
+          </p:cNvSpPr>
+          <p:nvPr>
+            <p:ph type="sldNum" sz="quarter" idx="5"/>
+          </p:nvPr>
+        </p:nvSpPr>
+        <p:spPr/>
+        <p:txBody>
+          <a:bodyPr/>
+          <a:lstStyle/>
+          <a:p>
+            <a:fld id="{A6961DC2-A28F-4C81-9966-8D7B3191DD23}" type="slidenum">
+              <a:rPr lang="en-US" smtClean="0"/>
+              <a:t>4</a:t>
+            </a:fld>
+            <a:endParaRPr lang="en-US"/>
+          </a:p>
+        </p:txBody>
+      </p:sp>
+    </p:spTree>
+    <p:extLst>
+      <p:ext uri="{BB962C8B-B14F-4D97-AF65-F5344CB8AC3E}">
+        <p14:creationId xmlns:p14="http://schemas.microsoft.com/office/powerpoint/2010/main" val="320368761"/>
+      </p:ext>
+    </p:extLst>
+  </p:cSld>
+  <p:clrMapOvr>
+    <a:masterClrMapping/>
+  </p:clrMapOvr>
+</p:notes>
+</file>
+
+<file path=ppt/notesSlides/notesSlide5.xml><?xml version="1.0" encoding="utf-8"?>
+<p:notes xmlns:a="http://schemas.openxmlformats.org/drawingml/2006/main" xmlns:r="http://schemas.openxmlformats.org/officeDocument/2006/relationships" xmlns:p="http://schemas.openxmlformats.org/presentationml/2006/main">
+  <p:cSld>
+    <p:spTree>
+      <p:nvGrpSpPr>
+        <p:cNvPr id="1" name=""/>
+        <p:cNvGrpSpPr/>
+        <p:nvPr/>
+      </p:nvGrpSpPr>
+      <p:grpSpPr>
+        <a:xfrm>
+          <a:off x="0" y="0"/>
+          <a:ext cx="0" cy="0"/>
+          <a:chOff x="0" y="0"/>
+          <a:chExt cx="0" cy="0"/>
+        </a:xfrm>
+      </p:grpSpPr>
+      <p:sp>
+        <p:nvSpPr>
+          <p:cNvPr id="2" name="Slide Image Placeholder 1"/>
+          <p:cNvSpPr>
+            <a:spLocks noGrp="1" noRot="1" noChangeAspect="1"/>
+          </p:cNvSpPr>
+          <p:nvPr>
+            <p:ph type="sldImg"/>
+          </p:nvPr>
+        </p:nvSpPr>
+        <p:spPr/>
+      </p:sp>
+      <p:sp>
+        <p:nvSpPr>
+          <p:cNvPr id="3" name="Notes Placeholder 2"/>
+          <p:cNvSpPr>
+            <a:spLocks noGrp="1"/>
+          </p:cNvSpPr>
+          <p:nvPr>
+            <p:ph type="body" idx="1"/>
+          </p:nvPr>
+        </p:nvSpPr>
+        <p:spPr/>
+        <p:txBody>
+          <a:bodyPr/>
+          <a:lstStyle/>
+          <a:p>
+            <a:endParaRPr lang="en-US"/>
+          </a:p>
+        </p:txBody>
+      </p:sp>
+      <p:sp>
+        <p:nvSpPr>
+          <p:cNvPr id="4" name="Slide Number Placeholder 3"/>
+          <p:cNvSpPr>
+            <a:spLocks noGrp="1"/>
+          </p:cNvSpPr>
+          <p:nvPr>
+            <p:ph type="sldNum" sz="quarter" idx="5"/>
+          </p:nvPr>
+        </p:nvSpPr>
+        <p:spPr/>
+        <p:txBody>
+          <a:bodyPr/>
+          <a:lstStyle/>
+          <a:p>
+            <a:fld id="{A6961DC2-A28F-4C81-9966-8D7B3191DD23}" type="slidenum">
+              <a:rPr lang="en-US" smtClean="0"/>
+              <a:t>5</a:t>
+            </a:fld>
+            <a:endParaRPr lang="en-US"/>
+          </a:p>
+        </p:txBody>
+      </p:sp>
+    </p:spTree>
+    <p:extLst>
+      <p:ext uri="{BB962C8B-B14F-4D97-AF65-F5344CB8AC3E}">
+        <p14:creationId xmlns:p14="http://schemas.microsoft.com/office/powerpoint/2010/main" val="2737913987"/>
+      </p:ext>
+    </p:extLst>
+  </p:cSld>
+  <p:clrMapOvr>
+    <a:masterClrMapping/>
+  </p:clrMapOvr>
+</p:notes>
+</file>
+
+<file path=ppt/notesSlides/notesSlide6.xml><?xml version="1.0" encoding="utf-8"?>
+<p:notes xmlns:a="http://schemas.openxmlformats.org/drawingml/2006/main" xmlns:r="http://schemas.openxmlformats.org/officeDocument/2006/relationships" xmlns:p="http://schemas.openxmlformats.org/presentationml/2006/main">
+  <p:cSld>
+    <p:spTree>
+      <p:nvGrpSpPr>
+        <p:cNvPr id="1" name=""/>
+        <p:cNvGrpSpPr/>
+        <p:nvPr/>
+      </p:nvGrpSpPr>
+      <p:grpSpPr>
+        <a:xfrm>
+          <a:off x="0" y="0"/>
+          <a:ext cx="0" cy="0"/>
+          <a:chOff x="0" y="0"/>
+          <a:chExt cx="0" cy="0"/>
+        </a:xfrm>
+      </p:grpSpPr>
+      <p:sp>
+        <p:nvSpPr>
+          <p:cNvPr id="2" name="Slide Image Placeholder 1"/>
+          <p:cNvSpPr>
+            <a:spLocks noGrp="1" noRot="1" noChangeAspect="1"/>
+          </p:cNvSpPr>
+          <p:nvPr>
+            <p:ph type="sldImg"/>
+          </p:nvPr>
+        </p:nvSpPr>
+        <p:spPr/>
+      </p:sp>
+      <p:sp>
+        <p:nvSpPr>
+          <p:cNvPr id="3" name="Notes Placeholder 2"/>
+          <p:cNvSpPr>
+            <a:spLocks noGrp="1"/>
+          </p:cNvSpPr>
+          <p:nvPr>
+            <p:ph type="body" idx="1"/>
+          </p:nvPr>
+        </p:nvSpPr>
+        <p:spPr/>
+        <p:txBody>
+          <a:bodyPr/>
+          <a:lstStyle/>
+          <a:p>
+            <a:endParaRPr lang="en-US"/>
+          </a:p>
+        </p:txBody>
+      </p:sp>
+      <p:sp>
+        <p:nvSpPr>
+          <p:cNvPr id="4" name="Slide Number Placeholder 3"/>
+          <p:cNvSpPr>
+            <a:spLocks noGrp="1"/>
+          </p:cNvSpPr>
+          <p:nvPr>
+            <p:ph type="sldNum" sz="quarter" idx="5"/>
+          </p:nvPr>
+        </p:nvSpPr>
+        <p:spPr/>
+        <p:txBody>
+          <a:bodyPr/>
+          <a:lstStyle/>
+          <a:p>
+            <a:fld id="{A6961DC2-A28F-4C81-9966-8D7B3191DD23}" type="slidenum">
+              <a:rPr lang="en-US" smtClean="0"/>
+              <a:t>6</a:t>
+            </a:fld>
+            <a:endParaRPr lang="en-US"/>
+          </a:p>
+        </p:txBody>
+      </p:sp>
+    </p:spTree>
+    <p:extLst>
+      <p:ext uri="{BB962C8B-B14F-4D97-AF65-F5344CB8AC3E}">
+        <p14:creationId xmlns:p14="http://schemas.microsoft.com/office/powerpoint/2010/main" val="2211647572"/>
+      </p:ext>
+    </p:extLst>
+  </p:cSld>
+  <p:clrMapOvr>
+    <a:masterClrMapping/>
+  </p:clrMapOvr>
+</p:notes>
+</file>
+
+<file path=ppt/notesSlides/notesSlide7.xml><?xml version="1.0" encoding="utf-8"?>
+<p:notes xmlns:a="http://schemas.openxmlformats.org/drawingml/2006/main" xmlns:r="http://schemas.openxmlformats.org/officeDocument/2006/relationships" xmlns:p="http://schemas.openxmlformats.org/presentationml/2006/main">
+  <p:cSld>
+    <p:spTree>
+      <p:nvGrpSpPr>
+        <p:cNvPr id="1" name=""/>
+        <p:cNvGrpSpPr/>
+        <p:nvPr/>
+      </p:nvGrpSpPr>
+      <p:grpSpPr>
+        <a:xfrm>
+          <a:off x="0" y="0"/>
+          <a:ext cx="0" cy="0"/>
+          <a:chOff x="0" y="0"/>
+          <a:chExt cx="0" cy="0"/>
+        </a:xfrm>
+      </p:grpSpPr>
+      <p:sp>
+        <p:nvSpPr>
+          <p:cNvPr id="2" name="Slide Image Placeholder 1"/>
+          <p:cNvSpPr>
+            <a:spLocks noGrp="1" noRot="1" noChangeAspect="1"/>
+          </p:cNvSpPr>
+          <p:nvPr>
+            <p:ph type="sldImg"/>
+          </p:nvPr>
+        </p:nvSpPr>
+        <p:spPr/>
+      </p:sp>
+      <p:sp>
+        <p:nvSpPr>
+          <p:cNvPr id="3" name="Notes Placeholder 2"/>
+          <p:cNvSpPr>
+            <a:spLocks noGrp="1"/>
+          </p:cNvSpPr>
+          <p:nvPr>
+            <p:ph type="body" idx="1"/>
+          </p:nvPr>
+        </p:nvSpPr>
+        <p:spPr/>
+        <p:txBody>
+          <a:bodyPr/>
+          <a:lstStyle/>
+          <a:p>
+            <a:endParaRPr lang="en-US"/>
+          </a:p>
+        </p:txBody>
+      </p:sp>
+      <p:sp>
+        <p:nvSpPr>
+          <p:cNvPr id="4" name="Slide Number Placeholder 3"/>
+          <p:cNvSpPr>
+            <a:spLocks noGrp="1"/>
+          </p:cNvSpPr>
+          <p:nvPr>
+            <p:ph type="sldNum" sz="quarter" idx="5"/>
+          </p:nvPr>
+        </p:nvSpPr>
+        <p:spPr/>
+        <p:txBody>
+          <a:bodyPr/>
+          <a:lstStyle/>
+          <a:p>
+            <a:fld id="{A6961DC2-A28F-4C81-9966-8D7B3191DD23}" type="slidenum">
+              <a:rPr lang="en-US" smtClean="0"/>
+              <a:t>7</a:t>
+            </a:fld>
+            <a:endParaRPr lang="en-US"/>
+          </a:p>
+        </p:txBody>
+      </p:sp>
+    </p:spTree>
+    <p:extLst>
+      <p:ext uri="{BB962C8B-B14F-4D97-AF65-F5344CB8AC3E}">
+        <p14:creationId xmlns:p14="http://schemas.microsoft.com/office/powerpoint/2010/main" val="2795708721"/>
+      </p:ext>
+    </p:extLst>
+  </p:cSld>
+  <p:clrMapOvr>
+    <a:masterClrMapping/>
+  </p:clrMapOvr>
+</p:notes>
+</file>
+
+<file path=ppt/notesSlides/notesSlide8.xml><?xml version="1.0" encoding="utf-8"?>
+<p:notes xmlns:a="http://schemas.openxmlformats.org/drawingml/2006/main" xmlns:r="http://schemas.openxmlformats.org/officeDocument/2006/relationships" xmlns:p="http://schemas.openxmlformats.org/presentationml/2006/main">
+  <p:cSld>
+    <p:spTree>
+      <p:nvGrpSpPr>
+        <p:cNvPr id="1" name=""/>
+        <p:cNvGrpSpPr/>
+        <p:nvPr/>
+      </p:nvGrpSpPr>
+      <p:grpSpPr>
+        <a:xfrm>
+          <a:off x="0" y="0"/>
+          <a:ext cx="0" cy="0"/>
+          <a:chOff x="0" y="0"/>
+          <a:chExt cx="0" cy="0"/>
+        </a:xfrm>
+      </p:grpSpPr>
+      <p:sp>
+        <p:nvSpPr>
+          <p:cNvPr id="2" name="Slide Image Placeholder 1"/>
+          <p:cNvSpPr>
+            <a:spLocks noGrp="1" noRot="1" noChangeAspect="1"/>
+          </p:cNvSpPr>
+          <p:nvPr>
+            <p:ph type="sldImg"/>
+          </p:nvPr>
+        </p:nvSpPr>
+        <p:spPr/>
+      </p:sp>
+      <p:sp>
+        <p:nvSpPr>
+          <p:cNvPr id="3" name="Notes Placeholder 2"/>
+          <p:cNvSpPr>
+            <a:spLocks noGrp="1"/>
+          </p:cNvSpPr>
+          <p:nvPr>
+            <p:ph type="body" idx="1"/>
+          </p:nvPr>
+        </p:nvSpPr>
+        <p:spPr/>
+        <p:txBody>
+          <a:bodyPr/>
+          <a:lstStyle/>
+          <a:p>
+            <a:endParaRPr lang="en-US"/>
+          </a:p>
+        </p:txBody>
+      </p:sp>
+      <p:sp>
+        <p:nvSpPr>
+          <p:cNvPr id="4" name="Slide Number Placeholder 3"/>
+          <p:cNvSpPr>
+            <a:spLocks noGrp="1"/>
+          </p:cNvSpPr>
+          <p:nvPr>
+            <p:ph type="sldNum" sz="quarter" idx="5"/>
+          </p:nvPr>
+        </p:nvSpPr>
+        <p:spPr/>
+        <p:txBody>
+          <a:bodyPr/>
+          <a:lstStyle/>
+          <a:p>
+            <a:fld id="{A6961DC2-A28F-4C81-9966-8D7B3191DD23}" type="slidenum">
+              <a:rPr lang="en-US" smtClean="0"/>
+              <a:t>8</a:t>
+            </a:fld>
+            <a:endParaRPr lang="en-US"/>
+          </a:p>
+        </p:txBody>
+      </p:sp>
+    </p:spTree>
+    <p:extLst>
+      <p:ext uri="{BB962C8B-B14F-4D97-AF65-F5344CB8AC3E}">
+        <p14:creationId xmlns:p14="http://schemas.microsoft.com/office/powerpoint/2010/main" val="3665406817"/>
+      </p:ext>
+    </p:extLst>
+  </p:cSld>
+  <p:clrMapOvr>
+    <a:masterClrMapping/>
+  </p:clrMapOvr>
+</p:notes>
+</file>
+
+<file path=ppt/notesSlides/notesSlide9.xml><?xml version="1.0" encoding="utf-8"?>
+<p:notes xmlns:a="http://schemas.openxmlformats.org/drawingml/2006/main" xmlns:r="http://schemas.openxmlformats.org/officeDocument/2006/relationships" xmlns:p="http://schemas.openxmlformats.org/presentationml/2006/main">
+  <p:cSld>
+    <p:spTree>
+      <p:nvGrpSpPr>
+        <p:cNvPr id="1" name=""/>
+        <p:cNvGrpSpPr/>
+        <p:nvPr/>
+      </p:nvGrpSpPr>
+      <p:grpSpPr>
+        <a:xfrm>
+          <a:off x="0" y="0"/>
+          <a:ext cx="0" cy="0"/>
+          <a:chOff x="0" y="0"/>
+          <a:chExt cx="0" cy="0"/>
+        </a:xfrm>
+      </p:grpSpPr>
+      <p:sp>
+        <p:nvSpPr>
+          <p:cNvPr id="2" name="Slide Image Placeholder 1"/>
+          <p:cNvSpPr>
+            <a:spLocks noGrp="1" noRot="1" noChangeAspect="1"/>
+          </p:cNvSpPr>
+          <p:nvPr>
+            <p:ph type="sldImg"/>
+          </p:nvPr>
+        </p:nvSpPr>
+        <p:spPr/>
+      </p:sp>
+      <p:sp>
+        <p:nvSpPr>
+          <p:cNvPr id="3" name="Notes Placeholder 2"/>
+          <p:cNvSpPr>
+            <a:spLocks noGrp="1"/>
+          </p:cNvSpPr>
+          <p:nvPr>
+            <p:ph type="body" idx="1"/>
+          </p:nvPr>
+        </p:nvSpPr>
+        <p:spPr/>
+        <p:txBody>
+          <a:bodyPr/>
+          <a:lstStyle/>
+          <a:p>
+            <a:endParaRPr lang="en-US"/>
+          </a:p>
+        </p:txBody>
+      </p:sp>
+      <p:sp>
+        <p:nvSpPr>
+          <p:cNvPr id="4" name="Slide Number Placeholder 3"/>
+          <p:cNvSpPr>
+            <a:spLocks noGrp="1"/>
+          </p:cNvSpPr>
+          <p:nvPr>
+            <p:ph type="sldNum" sz="quarter" idx="5"/>
+          </p:nvPr>
+        </p:nvSpPr>
+        <p:spPr/>
+        <p:txBody>
+          <a:bodyPr/>
+          <a:lstStyle/>
+          <a:p>
+            <a:fld id="{A6961DC2-A28F-4C81-9966-8D7B3191DD23}" type="slidenum">
+              <a:rPr lang="en-US" smtClean="0"/>
+              <a:t>9</a:t>
+            </a:fld>
+            <a:endParaRPr lang="en-US"/>
+          </a:p>
+        </p:txBody>
+      </p:sp>
+    </p:spTree>
+    <p:extLst>
+      <p:ext uri="{BB962C8B-B14F-4D97-AF65-F5344CB8AC3E}">
+        <p14:creationId xmlns:p14="http://schemas.microsoft.com/office/powerpoint/2010/main" val="3885826892"/>
+      </p:ext>
+    </p:extLst>
+  </p:cSld>
+  <p:clrMapOvr>
+    <a:masterClrMapping/>
+  </p:clrMapOvr>
+</p:notes>
 </file>
 
 <file path=ppt/slideLayouts/slideLayout1.xml><?xml version="1.0" encoding="utf-8"?>
@@ -16842,7 +19195,7 @@
                 <a:ea typeface="Verdana" panose="020B0604030504040204" pitchFamily="34" charset="0"/>
                 <a:cs typeface="Verdana" panose="020B0604030504040204" pitchFamily="34" charset="0"/>
               </a:rPr>
-              <a:t>JavaScript and Client-side Validation</a:t>
+              <a:t>Client-Side JavaScript and Validation</a:t>
             </a:r>
           </a:p>
           <a:p>
@@ -16862,7 +19215,7 @@
           </p:nvPr>
         </p:nvPicPr>
         <p:blipFill rotWithShape="1">
-          <a:blip r:embed="rId2" cstate="screen">
+          <a:blip r:embed="rId3" cstate="screen">
             <a:extLst>
               <a:ext uri="{28A0092B-C50C-407E-A947-70E740481C1C}">
                 <a14:useLocalDpi xmlns:a14="http://schemas.microsoft.com/office/drawing/2010/main"/>
@@ -17142,7 +19495,7 @@
                 <a:ea typeface="Verdana" panose="020B0604030504040204" pitchFamily="34" charset="0"/>
                 <a:cs typeface="Verdana" panose="020B0604030504040204" pitchFamily="34" charset="0"/>
               </a:rPr>
-              <a:t>Where does it fit in?</a:t>
+              <a:t>Where Does it Fit in?</a:t>
             </a:r>
           </a:p>
         </p:txBody>
@@ -17305,7 +19658,7 @@
                 <a:ea typeface="Verdana" panose="020B0604030504040204" pitchFamily="34" charset="0"/>
                 <a:cs typeface="Verdana" panose="020B0604030504040204" pitchFamily="34" charset="0"/>
               </a:rPr>
-              <a:t>Why is this important?</a:t>
+              <a:t>Why is this Important?</a:t>
             </a:r>
           </a:p>
         </p:txBody>
@@ -17490,7 +19843,7 @@
                 <a:ea typeface="Verdana" panose="020B0604030504040204" pitchFamily="34" charset="0"/>
                 <a:cs typeface="Verdana" panose="020B0604030504040204" pitchFamily="34" charset="0"/>
               </a:rPr>
-              <a:t>A practical example of using the DOM</a:t>
+              <a:t>A Practical Example of Using the DOM</a:t>
             </a:r>
           </a:p>
         </p:txBody>
@@ -17787,7 +20140,7 @@
           </p:nvPr>
         </p:nvPicPr>
         <p:blipFill rotWithShape="1">
-          <a:blip r:embed="rId2" cstate="screen">
+          <a:blip r:embed="rId3" cstate="screen">
             <a:extLst>
               <a:ext uri="{28A0092B-C50C-407E-A947-70E740481C1C}">
                 <a14:useLocalDpi xmlns:a14="http://schemas.microsoft.com/office/drawing/2010/main"/>
@@ -17880,18 +20233,24 @@
           <a:p>
             <a:pPr lvl="1"/>
             <a:r>
-              <a:rPr lang="en-US" sz="2000" dirty="0" err="1">
-                <a:latin typeface="Verdana" panose="020B0604030504040204" pitchFamily="34" charset="0"/>
+              <a:rPr lang="en-US" sz="2000" b="1" dirty="0" err="1">
+                <a:solidFill>
+                  <a:srgbClr val="AB262E"/>
+                </a:solidFill>
+                <a:latin typeface="Courier New" panose="02070309020205020404" pitchFamily="49" charset="0"/>
                 <a:ea typeface="Verdana" panose="020B0604030504040204" pitchFamily="34" charset="0"/>
-                <a:cs typeface="Verdana" panose="020B0604030504040204" pitchFamily="34" charset="0"/>
+                <a:cs typeface="Courier New" panose="02070309020205020404" pitchFamily="49" charset="0"/>
               </a:rPr>
               <a:t>document.getElementById</a:t>
             </a:r>
             <a:r>
-              <a:rPr lang="en-US" sz="2000" dirty="0">
-                <a:latin typeface="Verdana" panose="020B0604030504040204" pitchFamily="34" charset="0"/>
+              <a:rPr lang="en-US" sz="2000" b="1" dirty="0">
+                <a:solidFill>
+                  <a:srgbClr val="AB262E"/>
+                </a:solidFill>
+                <a:latin typeface="Courier New" panose="02070309020205020404" pitchFamily="49" charset="0"/>
                 <a:ea typeface="Verdana" panose="020B0604030504040204" pitchFamily="34" charset="0"/>
-                <a:cs typeface="Verdana" panose="020B0604030504040204" pitchFamily="34" charset="0"/>
+                <a:cs typeface="Courier New" panose="02070309020205020404" pitchFamily="49" charset="0"/>
               </a:rPr>
               <a:t>(“content”);</a:t>
             </a:r>
@@ -17899,18 +20258,24 @@
           <a:p>
             <a:pPr lvl="1"/>
             <a:r>
-              <a:rPr lang="en-US" sz="2000" dirty="0" err="1">
-                <a:latin typeface="Verdana" panose="020B0604030504040204" pitchFamily="34" charset="0"/>
+              <a:rPr lang="en-US" sz="2000" b="1" dirty="0" err="1">
+                <a:solidFill>
+                  <a:srgbClr val="AB262E"/>
+                </a:solidFill>
+                <a:latin typeface="Courier New" panose="02070309020205020404" pitchFamily="49" charset="0"/>
                 <a:ea typeface="Verdana" panose="020B0604030504040204" pitchFamily="34" charset="0"/>
-                <a:cs typeface="Verdana" panose="020B0604030504040204" pitchFamily="34" charset="0"/>
+                <a:cs typeface="Courier New" panose="02070309020205020404" pitchFamily="49" charset="0"/>
               </a:rPr>
               <a:t>document.getElementsByTagName</a:t>
             </a:r>
             <a:r>
-              <a:rPr lang="en-US" sz="2000" dirty="0">
-                <a:latin typeface="Verdana" panose="020B0604030504040204" pitchFamily="34" charset="0"/>
+              <a:rPr lang="en-US" sz="2000" b="1" dirty="0">
+                <a:solidFill>
+                  <a:srgbClr val="AB262E"/>
+                </a:solidFill>
+                <a:latin typeface="Courier New" panose="02070309020205020404" pitchFamily="49" charset="0"/>
                 <a:ea typeface="Verdana" panose="020B0604030504040204" pitchFamily="34" charset="0"/>
-                <a:cs typeface="Verdana" panose="020B0604030504040204" pitchFamily="34" charset="0"/>
+                <a:cs typeface="Courier New" panose="02070309020205020404" pitchFamily="49" charset="0"/>
               </a:rPr>
               <a:t>(“li”);</a:t>
             </a:r>
@@ -17918,18 +20283,24 @@
           <a:p>
             <a:pPr lvl="1"/>
             <a:r>
-              <a:rPr lang="en-US" sz="2000" dirty="0" err="1">
-                <a:latin typeface="Verdana" panose="020B0604030504040204" pitchFamily="34" charset="0"/>
+              <a:rPr lang="en-US" sz="2000" b="1" dirty="0" err="1">
+                <a:solidFill>
+                  <a:srgbClr val="AB262E"/>
+                </a:solidFill>
+                <a:latin typeface="Courier New" panose="02070309020205020404" pitchFamily="49" charset="0"/>
                 <a:ea typeface="Verdana" panose="020B0604030504040204" pitchFamily="34" charset="0"/>
-                <a:cs typeface="Verdana" panose="020B0604030504040204" pitchFamily="34" charset="0"/>
+                <a:cs typeface="Courier New" panose="02070309020205020404" pitchFamily="49" charset="0"/>
               </a:rPr>
               <a:t>document.getElementsByTagName</a:t>
             </a:r>
             <a:r>
-              <a:rPr lang="en-US" sz="2000" dirty="0">
-                <a:latin typeface="Verdana" panose="020B0604030504040204" pitchFamily="34" charset="0"/>
+              <a:rPr lang="en-US" sz="2000" b="1" dirty="0">
+                <a:solidFill>
+                  <a:srgbClr val="AB262E"/>
+                </a:solidFill>
+                <a:latin typeface="Courier New" panose="02070309020205020404" pitchFamily="49" charset="0"/>
                 <a:ea typeface="Verdana" panose="020B0604030504040204" pitchFamily="34" charset="0"/>
-                <a:cs typeface="Verdana" panose="020B0604030504040204" pitchFamily="34" charset="0"/>
+                <a:cs typeface="Courier New" panose="02070309020205020404" pitchFamily="49" charset="0"/>
               </a:rPr>
               <a:t>(“div”);</a:t>
             </a:r>
@@ -17937,18 +20308,24 @@
           <a:p>
             <a:pPr lvl="1"/>
             <a:r>
-              <a:rPr lang="en-US" sz="2000" dirty="0" err="1">
-                <a:latin typeface="Verdana" panose="020B0604030504040204" pitchFamily="34" charset="0"/>
+              <a:rPr lang="en-US" sz="2000" b="1" dirty="0" err="1">
+                <a:solidFill>
+                  <a:srgbClr val="AB262E"/>
+                </a:solidFill>
+                <a:latin typeface="Courier New" panose="02070309020205020404" pitchFamily="49" charset="0"/>
                 <a:ea typeface="Verdana" panose="020B0604030504040204" pitchFamily="34" charset="0"/>
-                <a:cs typeface="Verdana" panose="020B0604030504040204" pitchFamily="34" charset="0"/>
+                <a:cs typeface="Courier New" panose="02070309020205020404" pitchFamily="49" charset="0"/>
               </a:rPr>
               <a:t>document.querySelector</a:t>
             </a:r>
             <a:r>
-              <a:rPr lang="en-US" sz="2000" dirty="0">
-                <a:latin typeface="Verdana" panose="020B0604030504040204" pitchFamily="34" charset="0"/>
+              <a:rPr lang="en-US" sz="2000" b="1" dirty="0">
+                <a:solidFill>
+                  <a:srgbClr val="AB262E"/>
+                </a:solidFill>
+                <a:latin typeface="Courier New" panose="02070309020205020404" pitchFamily="49" charset="0"/>
                 <a:ea typeface="Verdana" panose="020B0604030504040204" pitchFamily="34" charset="0"/>
-                <a:cs typeface="Verdana" panose="020B0604030504040204" pitchFamily="34" charset="0"/>
+                <a:cs typeface="Courier New" panose="02070309020205020404" pitchFamily="49" charset="0"/>
               </a:rPr>
               <a:t>("div");</a:t>
             </a:r>
@@ -17956,18 +20333,24 @@
           <a:p>
             <a:pPr lvl="1"/>
             <a:r>
-              <a:rPr lang="en-US" sz="2000" dirty="0" err="1">
-                <a:latin typeface="Verdana" panose="020B0604030504040204" pitchFamily="34" charset="0"/>
+              <a:rPr lang="en-US" sz="2000" b="1" dirty="0" err="1">
+                <a:solidFill>
+                  <a:srgbClr val="AB262E"/>
+                </a:solidFill>
+                <a:latin typeface="Courier New" panose="02070309020205020404" pitchFamily="49" charset="0"/>
                 <a:ea typeface="Verdana" panose="020B0604030504040204" pitchFamily="34" charset="0"/>
-                <a:cs typeface="Verdana" panose="020B0604030504040204" pitchFamily="34" charset="0"/>
+                <a:cs typeface="Courier New" panose="02070309020205020404" pitchFamily="49" charset="0"/>
               </a:rPr>
               <a:t>document.querySelectorAll</a:t>
             </a:r>
             <a:r>
-              <a:rPr lang="en-US" sz="2000" dirty="0">
-                <a:latin typeface="Verdana" panose="020B0604030504040204" pitchFamily="34" charset="0"/>
+              <a:rPr lang="en-US" sz="2000" b="1" dirty="0">
+                <a:solidFill>
+                  <a:srgbClr val="AB262E"/>
+                </a:solidFill>
+                <a:latin typeface="Courier New" panose="02070309020205020404" pitchFamily="49" charset="0"/>
                 <a:ea typeface="Verdana" panose="020B0604030504040204" pitchFamily="34" charset="0"/>
-                <a:cs typeface="Verdana" panose="020B0604030504040204" pitchFamily="34" charset="0"/>
+                <a:cs typeface="Courier New" panose="02070309020205020404" pitchFamily="49" charset="0"/>
               </a:rPr>
               <a:t>("div &gt; a");</a:t>
             </a:r>
@@ -17991,6 +20374,9 @@
             </a:pPr>
             <a:r>
               <a:rPr lang="en-US" sz="2000" b="1" dirty="0">
+                <a:solidFill>
+                  <a:srgbClr val="AB262E"/>
+                </a:solidFill>
                 <a:latin typeface="Verdana" panose="020B0604030504040204" pitchFamily="34" charset="0"/>
                 <a:ea typeface="Verdana" panose="020B0604030504040204" pitchFamily="34" charset="0"/>
                 <a:cs typeface="Verdana" panose="020B0604030504040204" pitchFamily="34" charset="0"/>
@@ -18012,11 +20398,24 @@
             </a:pPr>
             <a:r>
               <a:rPr lang="en-US" sz="2000" dirty="0">
-                <a:hlinkClick r:id="rId2"/>
+                <a:solidFill>
+                  <a:srgbClr val="AB262E"/>
+                </a:solidFill>
+                <a:hlinkClick r:id="rId3">
+                  <a:extLst>
+                    <a:ext uri="{A12FA001-AC4F-418D-AE19-62706E023703}">
+                      <ahyp:hlinkClr xmlns:ahyp="http://schemas.microsoft.com/office/drawing/2018/hyperlinkcolor" val="tx"/>
+                    </a:ext>
+                  </a:extLst>
+                </a:hlinkClick>
               </a:rPr>
               <a:t>https://developer.mozilla.org/en-US/docs/Web/API/Document</a:t>
             </a:r>
-            <a:endParaRPr lang="en-US" sz="2000" dirty="0"/>
+            <a:endParaRPr lang="en-US" sz="2000" dirty="0">
+              <a:solidFill>
+                <a:srgbClr val="AB262E"/>
+              </a:solidFill>
+            </a:endParaRPr>
           </a:p>
           <a:p>
             <a:pPr marL="0" indent="0">
@@ -18026,7 +20425,7 @@
               <a:latin typeface="Verdana" panose="020B0604030504040204" pitchFamily="34" charset="0"/>
               <a:ea typeface="Verdana" panose="020B0604030504040204" pitchFamily="34" charset="0"/>
               <a:cs typeface="Verdana" panose="020B0604030504040204" pitchFamily="34" charset="0"/>
-              <a:hlinkClick r:id="rId2"/>
+              <a:hlinkClick r:id="rId3"/>
             </a:endParaRPr>
           </a:p>
         </p:txBody>
@@ -18262,14 +20661,26 @@
           <a:p>
             <a:r>
               <a:rPr lang="en-US" sz="2000" dirty="0">
+                <a:solidFill>
+                  <a:srgbClr val="AB262E"/>
+                </a:solidFill>
                 <a:latin typeface="Verdana" panose="020B0604030504040204" pitchFamily="34" charset="0"/>
                 <a:ea typeface="Verdana" panose="020B0604030504040204" pitchFamily="34" charset="0"/>
                 <a:cs typeface="Verdana" panose="020B0604030504040204" pitchFamily="34" charset="0"/>
-                <a:hlinkClick r:id="rId2"/>
+                <a:hlinkClick r:id="rId3">
+                  <a:extLst>
+                    <a:ext uri="{A12FA001-AC4F-418D-AE19-62706E023703}">
+                      <ahyp:hlinkClr xmlns:ahyp="http://schemas.microsoft.com/office/drawing/2018/hyperlinkcolor" val="tx"/>
+                    </a:ext>
+                  </a:extLst>
+                </a:hlinkClick>
               </a:rPr>
               <a:t>https://developer.mozilla.org/en-US/docs/Web/API/Element</a:t>
             </a:r>
             <a:endParaRPr lang="en-US" sz="2000" dirty="0">
+              <a:solidFill>
+                <a:srgbClr val="AB262E"/>
+              </a:solidFill>
               <a:latin typeface="Verdana" panose="020B0604030504040204" pitchFamily="34" charset="0"/>
               <a:ea typeface="Verdana" panose="020B0604030504040204" pitchFamily="34" charset="0"/>
               <a:cs typeface="Verdana" panose="020B0604030504040204" pitchFamily="34" charset="0"/>
@@ -18278,14 +20689,26 @@
           <a:p>
             <a:r>
               <a:rPr lang="en-US" sz="2000" dirty="0">
+                <a:solidFill>
+                  <a:srgbClr val="AB262E"/>
+                </a:solidFill>
                 <a:latin typeface="Verdana" panose="020B0604030504040204" pitchFamily="34" charset="0"/>
                 <a:ea typeface="Verdana" panose="020B0604030504040204" pitchFamily="34" charset="0"/>
                 <a:cs typeface="Verdana" panose="020B0604030504040204" pitchFamily="34" charset="0"/>
-                <a:hlinkClick r:id="rId3"/>
+                <a:hlinkClick r:id="rId4">
+                  <a:extLst>
+                    <a:ext uri="{A12FA001-AC4F-418D-AE19-62706E023703}">
+                      <ahyp:hlinkClr xmlns:ahyp="http://schemas.microsoft.com/office/drawing/2018/hyperlinkcolor" val="tx"/>
+                    </a:ext>
+                  </a:extLst>
+                </a:hlinkClick>
               </a:rPr>
               <a:t>https://developer.mozilla.org/en-US/docs/Web/API/HTMLElement</a:t>
             </a:r>
             <a:endParaRPr lang="en-US" sz="2000" dirty="0">
+              <a:solidFill>
+                <a:srgbClr val="AB262E"/>
+              </a:solidFill>
               <a:latin typeface="Verdana" panose="020B0604030504040204" pitchFamily="34" charset="0"/>
               <a:ea typeface="Verdana" panose="020B0604030504040204" pitchFamily="34" charset="0"/>
               <a:cs typeface="Verdana" panose="020B0604030504040204" pitchFamily="34" charset="0"/>
@@ -18341,7 +20764,7 @@
                 <a:ea typeface="Verdana" panose="020B0604030504040204" pitchFamily="34" charset="0"/>
                 <a:cs typeface="Verdana" panose="020B0604030504040204" pitchFamily="34" charset="0"/>
               </a:rPr>
-              <a:t>What can we do with a DOM Element?</a:t>
+              <a:t>What Can We Do With a DOM Element?</a:t>
             </a:r>
           </a:p>
         </p:txBody>
@@ -18415,7 +20838,10 @@
               <a:t>The </a:t>
             </a:r>
             <a:r>
-              <a:rPr lang="en-US" sz="2000" i="1" dirty="0" err="1">
+              <a:rPr lang="en-US" sz="2000" b="1" i="1" dirty="0" err="1">
+                <a:solidFill>
+                  <a:srgbClr val="AB262E"/>
+                </a:solidFill>
                 <a:latin typeface="Verdana" panose="020B0604030504040204" pitchFamily="34" charset="0"/>
                 <a:ea typeface="Verdana" panose="020B0604030504040204" pitchFamily="34" charset="0"/>
                 <a:cs typeface="Verdana" panose="020B0604030504040204" pitchFamily="34" charset="0"/>
@@ -18423,7 +20849,10 @@
               <a:t>document.createElement</a:t>
             </a:r>
             <a:r>
-              <a:rPr lang="en-US" sz="2000" i="1" dirty="0">
+              <a:rPr lang="en-US" sz="2000" b="1" i="1" dirty="0">
+                <a:solidFill>
+                  <a:srgbClr val="AB262E"/>
+                </a:solidFill>
                 <a:latin typeface="Verdana" panose="020B0604030504040204" pitchFamily="34" charset="0"/>
                 <a:ea typeface="Verdana" panose="020B0604030504040204" pitchFamily="34" charset="0"/>
                 <a:cs typeface="Verdana" panose="020B0604030504040204" pitchFamily="34" charset="0"/>
@@ -18431,12 +20860,23 @@
               <a:t>(“input”)</a:t>
             </a:r>
             <a:r>
+              <a:rPr lang="en-US" sz="2000" b="1" dirty="0">
+                <a:solidFill>
+                  <a:srgbClr val="AB262E"/>
+                </a:solidFill>
+                <a:latin typeface="Verdana" panose="020B0604030504040204" pitchFamily="34" charset="0"/>
+                <a:ea typeface="Verdana" panose="020B0604030504040204" pitchFamily="34" charset="0"/>
+                <a:cs typeface="Verdana" panose="020B0604030504040204" pitchFamily="34" charset="0"/>
+              </a:rPr>
+              <a:t> </a:t>
+            </a:r>
+            <a:r>
               <a:rPr lang="en-US" sz="2000" dirty="0">
                 <a:latin typeface="Verdana" panose="020B0604030504040204" pitchFamily="34" charset="0"/>
                 <a:ea typeface="Verdana" panose="020B0604030504040204" pitchFamily="34" charset="0"/>
                 <a:cs typeface="Verdana" panose="020B0604030504040204" pitchFamily="34" charset="0"/>
               </a:rPr>
-              <a:t> method will create and return a new DOM element, but it will not yet be attached to the DOM tree (and therefore, the render tree; it will not show up on the screen).</a:t>
+              <a:t>method will create and return a new DOM element, but it will not yet be attached to the DOM tree (and therefore, the render tree; it will not show up on the screen).</a:t>
             </a:r>
           </a:p>
           <a:p>
@@ -18499,7 +20939,7 @@
                 <a:ea typeface="Verdana" panose="020B0604030504040204" pitchFamily="34" charset="0"/>
                 <a:cs typeface="Verdana" panose="020B0604030504040204" pitchFamily="34" charset="0"/>
               </a:rPr>
-              <a:t>Creating a new element (input)</a:t>
+              <a:t>Creating a New Element (Input)</a:t>
             </a:r>
           </a:p>
         </p:txBody>
@@ -18579,7 +21019,10 @@
               <a:t>You can move the elements from parent to parent by using the </a:t>
             </a:r>
             <a:r>
-              <a:rPr lang="en-US" sz="2000" i="1" dirty="0" err="1">
+              <a:rPr lang="en-US" sz="2000" b="1" i="1" dirty="0" err="1">
+                <a:solidFill>
+                  <a:srgbClr val="AB262E"/>
+                </a:solidFill>
                 <a:latin typeface="Verdana" panose="020B0604030504040204" pitchFamily="34" charset="0"/>
                 <a:ea typeface="Verdana" panose="020B0604030504040204" pitchFamily="34" charset="0"/>
                 <a:cs typeface="Verdana" panose="020B0604030504040204" pitchFamily="34" charset="0"/>
@@ -18587,7 +21030,10 @@
               <a:t>parent.appendChild</a:t>
             </a:r>
             <a:r>
-              <a:rPr lang="en-US" sz="2000" i="1" dirty="0">
+              <a:rPr lang="en-US" sz="2000" b="1" i="1" dirty="0">
+                <a:solidFill>
+                  <a:srgbClr val="AB262E"/>
+                </a:solidFill>
                 <a:latin typeface="Verdana" panose="020B0604030504040204" pitchFamily="34" charset="0"/>
                 <a:ea typeface="Verdana" panose="020B0604030504040204" pitchFamily="34" charset="0"/>
                 <a:cs typeface="Verdana" panose="020B0604030504040204" pitchFamily="34" charset="0"/>
@@ -18595,7 +21041,10 @@
               <a:t>(</a:t>
             </a:r>
             <a:r>
-              <a:rPr lang="en-US" sz="2000" i="1" dirty="0" err="1">
+              <a:rPr lang="en-US" sz="2000" b="1" i="1" dirty="0" err="1">
+                <a:solidFill>
+                  <a:srgbClr val="AB262E"/>
+                </a:solidFill>
                 <a:latin typeface="Verdana" panose="020B0604030504040204" pitchFamily="34" charset="0"/>
                 <a:ea typeface="Verdana" panose="020B0604030504040204" pitchFamily="34" charset="0"/>
                 <a:cs typeface="Verdana" panose="020B0604030504040204" pitchFamily="34" charset="0"/>
@@ -18603,7 +21052,10 @@
               <a:t>newNode</a:t>
             </a:r>
             <a:r>
-              <a:rPr lang="en-US" sz="2000" i="1" dirty="0">
+              <a:rPr lang="en-US" sz="2000" b="1" i="1" dirty="0">
+                <a:solidFill>
+                  <a:srgbClr val="AB262E"/>
+                </a:solidFill>
                 <a:latin typeface="Verdana" panose="020B0604030504040204" pitchFamily="34" charset="0"/>
                 <a:ea typeface="Verdana" panose="020B0604030504040204" pitchFamily="34" charset="0"/>
                 <a:cs typeface="Verdana" panose="020B0604030504040204" pitchFamily="34" charset="0"/>
@@ -18619,7 +21071,10 @@
               <a:t>method, or the </a:t>
             </a:r>
             <a:r>
-              <a:rPr lang="en-US" sz="2000" i="1" dirty="0" err="1">
+              <a:rPr lang="en-US" sz="2000" b="1" i="1" dirty="0" err="1">
+                <a:solidFill>
+                  <a:srgbClr val="AB262E"/>
+                </a:solidFill>
                 <a:latin typeface="Verdana" panose="020B0604030504040204" pitchFamily="34" charset="0"/>
                 <a:ea typeface="Verdana" panose="020B0604030504040204" pitchFamily="34" charset="0"/>
                 <a:cs typeface="Verdana" panose="020B0604030504040204" pitchFamily="34" charset="0"/>
@@ -18627,7 +21082,10 @@
               <a:t>parentNode.insertBefore</a:t>
             </a:r>
             <a:r>
-              <a:rPr lang="en-US" sz="2000" i="1" dirty="0">
+              <a:rPr lang="en-US" sz="2000" b="1" i="1" dirty="0">
+                <a:solidFill>
+                  <a:srgbClr val="AB262E"/>
+                </a:solidFill>
                 <a:latin typeface="Verdana" panose="020B0604030504040204" pitchFamily="34" charset="0"/>
                 <a:ea typeface="Verdana" panose="020B0604030504040204" pitchFamily="34" charset="0"/>
                 <a:cs typeface="Verdana" panose="020B0604030504040204" pitchFamily="34" charset="0"/>
@@ -18635,7 +21093,10 @@
               <a:t>(</a:t>
             </a:r>
             <a:r>
-              <a:rPr lang="en-US" sz="2000" i="1" dirty="0" err="1">
+              <a:rPr lang="en-US" sz="2000" b="1" i="1" dirty="0" err="1">
+                <a:solidFill>
+                  <a:srgbClr val="AB262E"/>
+                </a:solidFill>
                 <a:latin typeface="Verdana" panose="020B0604030504040204" pitchFamily="34" charset="0"/>
                 <a:ea typeface="Verdana" panose="020B0604030504040204" pitchFamily="34" charset="0"/>
                 <a:cs typeface="Verdana" panose="020B0604030504040204" pitchFamily="34" charset="0"/>
@@ -18643,7 +21104,10 @@
               <a:t>newNode</a:t>
             </a:r>
             <a:r>
-              <a:rPr lang="en-US" sz="2000" i="1" dirty="0">
+              <a:rPr lang="en-US" sz="2000" b="1" i="1" dirty="0">
+                <a:solidFill>
+                  <a:srgbClr val="AB262E"/>
+                </a:solidFill>
                 <a:latin typeface="Verdana" panose="020B0604030504040204" pitchFamily="34" charset="0"/>
                 <a:ea typeface="Verdana" panose="020B0604030504040204" pitchFamily="34" charset="0"/>
                 <a:cs typeface="Verdana" panose="020B0604030504040204" pitchFamily="34" charset="0"/>
@@ -18651,7 +21115,10 @@
               <a:t>, </a:t>
             </a:r>
             <a:r>
-              <a:rPr lang="en-US" sz="2000" i="1" dirty="0" err="1">
+              <a:rPr lang="en-US" sz="2000" b="1" i="1" dirty="0" err="1">
+                <a:solidFill>
+                  <a:srgbClr val="AB262E"/>
+                </a:solidFill>
                 <a:latin typeface="Verdana" panose="020B0604030504040204" pitchFamily="34" charset="0"/>
                 <a:ea typeface="Verdana" panose="020B0604030504040204" pitchFamily="34" charset="0"/>
                 <a:cs typeface="Verdana" panose="020B0604030504040204" pitchFamily="34" charset="0"/>
@@ -18659,7 +21126,10 @@
               <a:t>oldNode</a:t>
             </a:r>
             <a:r>
-              <a:rPr lang="en-US" sz="2000" i="1" dirty="0">
+              <a:rPr lang="en-US" sz="2000" b="1" i="1" dirty="0">
+                <a:solidFill>
+                  <a:srgbClr val="AB262E"/>
+                </a:solidFill>
                 <a:latin typeface="Verdana" panose="020B0604030504040204" pitchFamily="34" charset="0"/>
                 <a:ea typeface="Verdana" panose="020B0604030504040204" pitchFamily="34" charset="0"/>
                 <a:cs typeface="Verdana" panose="020B0604030504040204" pitchFamily="34" charset="0"/>
@@ -18667,12 +21137,23 @@
               <a:t>)</a:t>
             </a:r>
             <a:r>
+              <a:rPr lang="en-US" sz="2000" b="1" dirty="0">
+                <a:solidFill>
+                  <a:srgbClr val="AB262E"/>
+                </a:solidFill>
+                <a:latin typeface="Verdana" panose="020B0604030504040204" pitchFamily="34" charset="0"/>
+                <a:ea typeface="Verdana" panose="020B0604030504040204" pitchFamily="34" charset="0"/>
+                <a:cs typeface="Verdana" panose="020B0604030504040204" pitchFamily="34" charset="0"/>
+              </a:rPr>
+              <a:t> </a:t>
+            </a:r>
+            <a:r>
               <a:rPr lang="en-US" sz="2000" dirty="0">
                 <a:latin typeface="Verdana" panose="020B0604030504040204" pitchFamily="34" charset="0"/>
                 <a:ea typeface="Verdana" panose="020B0604030504040204" pitchFamily="34" charset="0"/>
                 <a:cs typeface="Verdana" panose="020B0604030504040204" pitchFamily="34" charset="0"/>
               </a:rPr>
-              <a:t> methods.</a:t>
+              <a:t>methods.</a:t>
             </a:r>
           </a:p>
           <a:p>
@@ -18688,7 +21169,10 @@
               <a:t>You may remove elements using the </a:t>
             </a:r>
             <a:r>
-              <a:rPr lang="en-US" sz="2000" i="1" dirty="0" err="1">
+              <a:rPr lang="en-US" sz="2000" b="1" i="1" dirty="0" err="1">
+                <a:solidFill>
+                  <a:srgbClr val="AB262E"/>
+                </a:solidFill>
                 <a:latin typeface="Verdana" panose="020B0604030504040204" pitchFamily="34" charset="0"/>
                 <a:ea typeface="Verdana" panose="020B0604030504040204" pitchFamily="34" charset="0"/>
                 <a:cs typeface="Verdana" panose="020B0604030504040204" pitchFamily="34" charset="0"/>
@@ -18696,7 +21180,10 @@
               <a:t>parent.removeChild</a:t>
             </a:r>
             <a:r>
-              <a:rPr lang="en-US" sz="2000" i="1" dirty="0">
+              <a:rPr lang="en-US" sz="2000" b="1" i="1" dirty="0">
+                <a:solidFill>
+                  <a:srgbClr val="AB262E"/>
+                </a:solidFill>
                 <a:latin typeface="Verdana" panose="020B0604030504040204" pitchFamily="34" charset="0"/>
                 <a:ea typeface="Verdana" panose="020B0604030504040204" pitchFamily="34" charset="0"/>
                 <a:cs typeface="Verdana" panose="020B0604030504040204" pitchFamily="34" charset="0"/>
@@ -18704,7 +21191,10 @@
               <a:t>(</a:t>
             </a:r>
             <a:r>
-              <a:rPr lang="en-US" sz="2000" i="1" dirty="0" err="1">
+              <a:rPr lang="en-US" sz="2000" b="1" i="1" dirty="0" err="1">
+                <a:solidFill>
+                  <a:srgbClr val="AB262E"/>
+                </a:solidFill>
                 <a:latin typeface="Verdana" panose="020B0604030504040204" pitchFamily="34" charset="0"/>
                 <a:ea typeface="Verdana" panose="020B0604030504040204" pitchFamily="34" charset="0"/>
                 <a:cs typeface="Verdana" panose="020B0604030504040204" pitchFamily="34" charset="0"/>
@@ -18712,7 +21202,10 @@
               <a:t>childNode</a:t>
             </a:r>
             <a:r>
-              <a:rPr lang="en-US" sz="2000" i="1" dirty="0">
+              <a:rPr lang="en-US" sz="2000" b="1" i="1" dirty="0">
+                <a:solidFill>
+                  <a:srgbClr val="AB262E"/>
+                </a:solidFill>
                 <a:latin typeface="Verdana" panose="020B0604030504040204" pitchFamily="34" charset="0"/>
                 <a:ea typeface="Verdana" panose="020B0604030504040204" pitchFamily="34" charset="0"/>
                 <a:cs typeface="Verdana" panose="020B0604030504040204" pitchFamily="34" charset="0"/>
@@ -18720,12 +21213,23 @@
               <a:t>)</a:t>
             </a:r>
             <a:r>
+              <a:rPr lang="en-US" sz="2000" b="1" dirty="0">
+                <a:solidFill>
+                  <a:srgbClr val="AB262E"/>
+                </a:solidFill>
+                <a:latin typeface="Verdana" panose="020B0604030504040204" pitchFamily="34" charset="0"/>
+                <a:ea typeface="Verdana" panose="020B0604030504040204" pitchFamily="34" charset="0"/>
+                <a:cs typeface="Verdana" panose="020B0604030504040204" pitchFamily="34" charset="0"/>
+              </a:rPr>
+              <a:t> </a:t>
+            </a:r>
+            <a:r>
               <a:rPr lang="en-US" sz="2000" dirty="0">
                 <a:latin typeface="Verdana" panose="020B0604030504040204" pitchFamily="34" charset="0"/>
                 <a:ea typeface="Verdana" panose="020B0604030504040204" pitchFamily="34" charset="0"/>
                 <a:cs typeface="Verdana" panose="020B0604030504040204" pitchFamily="34" charset="0"/>
               </a:rPr>
-              <a:t> method.</a:t>
+              <a:t>method.</a:t>
             </a:r>
           </a:p>
           <a:p>
@@ -18815,7 +21319,7 @@
                 <a:ea typeface="Verdana" panose="020B0604030504040204" pitchFamily="34" charset="0"/>
                 <a:cs typeface="Verdana" panose="020B0604030504040204" pitchFamily="34" charset="0"/>
               </a:rPr>
-              <a:t>What can we do to manipulate the DOM?</a:t>
+              <a:t>What Can We Do to Manipulate the DOM?</a:t>
             </a:r>
           </a:p>
         </p:txBody>
@@ -18917,7 +21421,10 @@
               <a:t>Call the </a:t>
             </a:r>
             <a:r>
-              <a:rPr lang="en-US" sz="2000" i="1" dirty="0" err="1">
+              <a:rPr lang="en-US" sz="2000" b="1" i="1" dirty="0" err="1">
+                <a:solidFill>
+                  <a:srgbClr val="AB262E"/>
+                </a:solidFill>
                 <a:latin typeface="Verdana" panose="020B0604030504040204" pitchFamily="34" charset="0"/>
                 <a:ea typeface="Verdana" panose="020B0604030504040204" pitchFamily="34" charset="0"/>
                 <a:cs typeface="Verdana" panose="020B0604030504040204" pitchFamily="34" charset="0"/>
@@ -19111,7 +21618,7 @@
                 <a:latin typeface="Verdana" panose="020B0604030504040204" pitchFamily="34" charset="0"/>
                 <a:ea typeface="Verdana" panose="020B0604030504040204" pitchFamily="34" charset="0"/>
                 <a:cs typeface="Verdana" panose="020B0604030504040204" pitchFamily="34" charset="0"/>
-                <a:hlinkClick r:id="rId2">
+                <a:hlinkClick r:id="rId3">
                   <a:extLst>
                     <a:ext uri="{A12FA001-AC4F-418D-AE19-62706E023703}">
                       <ahyp:hlinkClr xmlns:ahyp="http://schemas.microsoft.com/office/drawing/2018/hyperlinkcolor" val="tx"/>
@@ -19259,7 +21766,10 @@
               <a:t> by using the </a:t>
             </a:r>
             <a:r>
-              <a:rPr lang="en-US" sz="2000" i="1" dirty="0" err="1">
+              <a:rPr lang="en-US" sz="2000" b="1" i="1" dirty="0" err="1">
+                <a:solidFill>
+                  <a:srgbClr val="AB262E"/>
+                </a:solidFill>
                 <a:latin typeface="Verdana" panose="020B0604030504040204" pitchFamily="34" charset="0"/>
                 <a:ea typeface="Verdana" panose="020B0604030504040204" pitchFamily="34" charset="0"/>
                 <a:cs typeface="Verdana" panose="020B0604030504040204" pitchFamily="34" charset="0"/>
@@ -19384,7 +21894,10 @@
               <a:buNone/>
             </a:pPr>
             <a:r>
-              <a:rPr lang="en-US" sz="2000" i="1" dirty="0" err="1">
+              <a:rPr lang="en-US" sz="2000" b="1" i="1" dirty="0" err="1">
+                <a:solidFill>
+                  <a:srgbClr val="AB262E"/>
+                </a:solidFill>
                 <a:latin typeface="Verdana" panose="020B0604030504040204" pitchFamily="34" charset="0"/>
                 <a:ea typeface="Verdana" panose="020B0604030504040204" pitchFamily="34" charset="0"/>
                 <a:cs typeface="Verdana" panose="020B0604030504040204" pitchFamily="34" charset="0"/>
@@ -19392,12 +21905,23 @@
               <a:t>document.title</a:t>
             </a:r>
             <a:r>
+              <a:rPr lang="en-US" sz="2000" b="1" dirty="0">
+                <a:solidFill>
+                  <a:srgbClr val="AB262E"/>
+                </a:solidFill>
+                <a:latin typeface="Verdana" panose="020B0604030504040204" pitchFamily="34" charset="0"/>
+                <a:ea typeface="Verdana" panose="020B0604030504040204" pitchFamily="34" charset="0"/>
+                <a:cs typeface="Verdana" panose="020B0604030504040204" pitchFamily="34" charset="0"/>
+              </a:rPr>
+              <a:t> </a:t>
+            </a:r>
+            <a:r>
               <a:rPr lang="en-US" sz="2000" dirty="0">
                 <a:latin typeface="Verdana" panose="020B0604030504040204" pitchFamily="34" charset="0"/>
                 <a:ea typeface="Verdana" panose="020B0604030504040204" pitchFamily="34" charset="0"/>
                 <a:cs typeface="Verdana" panose="020B0604030504040204" pitchFamily="34" charset="0"/>
               </a:rPr>
-              <a:t> allows you to get/set the Document’s Title; this is originally set to the content of the </a:t>
+              <a:t>allows you to get/set the Document’s Title; this is originally set to the content of the </a:t>
             </a:r>
             <a:r>
               <a:rPr lang="en-US" sz="2000" i="1" dirty="0">
@@ -19442,7 +21966,10 @@
               <a:buNone/>
             </a:pPr>
             <a:r>
-              <a:rPr lang="en-US" sz="2000" i="1" dirty="0" err="1">
+              <a:rPr lang="en-US" sz="2000" b="1" i="1" dirty="0" err="1">
+                <a:solidFill>
+                  <a:srgbClr val="AB262E"/>
+                </a:solidFill>
                 <a:latin typeface="Verdana" panose="020B0604030504040204" pitchFamily="34" charset="0"/>
                 <a:ea typeface="Verdana" panose="020B0604030504040204" pitchFamily="34" charset="0"/>
                 <a:cs typeface="Verdana" panose="020B0604030504040204" pitchFamily="34" charset="0"/>
@@ -19450,20 +21977,40 @@
               <a:t>document.cookies</a:t>
             </a:r>
             <a:r>
+              <a:rPr lang="en-US" sz="2000" b="1" dirty="0">
+                <a:solidFill>
+                  <a:srgbClr val="AB262E"/>
+                </a:solidFill>
+                <a:latin typeface="Verdana" panose="020B0604030504040204" pitchFamily="34" charset="0"/>
+                <a:ea typeface="Verdana" panose="020B0604030504040204" pitchFamily="34" charset="0"/>
+                <a:cs typeface="Verdana" panose="020B0604030504040204" pitchFamily="34" charset="0"/>
+              </a:rPr>
+              <a:t> </a:t>
+            </a:r>
+            <a:r>
               <a:rPr lang="en-US" sz="2000" dirty="0">
                 <a:latin typeface="Verdana" panose="020B0604030504040204" pitchFamily="34" charset="0"/>
                 <a:ea typeface="Verdana" panose="020B0604030504040204" pitchFamily="34" charset="0"/>
                 <a:cs typeface="Verdana" panose="020B0604030504040204" pitchFamily="34" charset="0"/>
               </a:rPr>
-              <a:t> allows you to get/set cookies that are currently being shared between your browser and the entire server at the current domain.</a:t>
+              <a:t>allows you to get/set cookies that are currently being shared between your browser and the entire server at the current domain.</a:t>
             </a:r>
           </a:p>
           <a:p>
             <a:endParaRPr lang="en-US" sz="2000" dirty="0">
+              <a:solidFill>
+                <a:srgbClr val="0000FF"/>
+              </a:solidFill>
               <a:latin typeface="Verdana" panose="020B0604030504040204" pitchFamily="34" charset="0"/>
               <a:ea typeface="Verdana" panose="020B0604030504040204" pitchFamily="34" charset="0"/>
               <a:cs typeface="Verdana" panose="020B0604030504040204" pitchFamily="34" charset="0"/>
-              <a:hlinkClick r:id="rId2"/>
+              <a:hlinkClick r:id="rId3">
+                <a:extLst>
+                  <a:ext uri="{A12FA001-AC4F-418D-AE19-62706E023703}">
+                    <ahyp:hlinkClr xmlns:ahyp="http://schemas.microsoft.com/office/drawing/2018/hyperlinkcolor" val="tx"/>
+                  </a:ext>
+                </a:extLst>
+              </a:hlinkClick>
             </a:endParaRPr>
           </a:p>
           <a:p>
@@ -19471,15 +22018,27 @@
               <a:buNone/>
             </a:pPr>
             <a:r>
-              <a:rPr lang="en-US" sz="2000" dirty="0">
+              <a:rPr lang="en-US" sz="2000" b="1" dirty="0">
+                <a:solidFill>
+                  <a:srgbClr val="AB262E"/>
+                </a:solidFill>
                 <a:latin typeface="Verdana" panose="020B0604030504040204" pitchFamily="34" charset="0"/>
                 <a:ea typeface="Verdana" panose="020B0604030504040204" pitchFamily="34" charset="0"/>
                 <a:cs typeface="Verdana" panose="020B0604030504040204" pitchFamily="34" charset="0"/>
-                <a:hlinkClick r:id="rId2"/>
+                <a:hlinkClick r:id="rId3">
+                  <a:extLst>
+                    <a:ext uri="{A12FA001-AC4F-418D-AE19-62706E023703}">
+                      <ahyp:hlinkClr xmlns:ahyp="http://schemas.microsoft.com/office/drawing/2018/hyperlinkcolor" val="tx"/>
+                    </a:ext>
+                  </a:extLst>
+                </a:hlinkClick>
               </a:rPr>
               <a:t>https://developer.mozilla.org/en-US/docs/Web/API/Document</a:t>
             </a:r>
-            <a:endParaRPr lang="en-US" sz="2000" dirty="0">
+            <a:endParaRPr lang="en-US" sz="2000" b="1" dirty="0">
+              <a:solidFill>
+                <a:srgbClr val="AB262E"/>
+              </a:solidFill>
               <a:latin typeface="Verdana" panose="020B0604030504040204" pitchFamily="34" charset="0"/>
               <a:ea typeface="Verdana" panose="020B0604030504040204" pitchFamily="34" charset="0"/>
               <a:cs typeface="Verdana" panose="020B0604030504040204" pitchFamily="34" charset="0"/>
@@ -19535,7 +22094,7 @@
                 <a:ea typeface="Verdana" panose="020B0604030504040204" pitchFamily="34" charset="0"/>
                 <a:cs typeface="Verdana" panose="020B0604030504040204" pitchFamily="34" charset="0"/>
               </a:rPr>
-              <a:t>Other Useful document properties</a:t>
+              <a:t>Other Useful Document Properties</a:t>
             </a:r>
           </a:p>
         </p:txBody>
@@ -19616,18 +22175,13 @@
           <a:p>
             <a:pPr algn="ctr"/>
             <a:r>
-              <a:rPr lang="en-US" sz="4000" dirty="0">
+              <a:rPr lang="en-US" sz="3800" b="1" dirty="0">
                 <a:latin typeface="Verdana" panose="020B0604030504040204" pitchFamily="34" charset="0"/>
                 <a:ea typeface="Verdana" panose="020B0604030504040204" pitchFamily="34" charset="0"/>
                 <a:cs typeface="Verdana" panose="020B0604030504040204" pitchFamily="34" charset="0"/>
               </a:rPr>
               <a:t>Client-Side Form Validation</a:t>
             </a:r>
-            <a:endParaRPr lang="en-US" dirty="0">
-              <a:latin typeface="Verdana" panose="020B0604030504040204" pitchFamily="34" charset="0"/>
-              <a:ea typeface="Verdana" panose="020B0604030504040204" pitchFamily="34" charset="0"/>
-              <a:cs typeface="Verdana" panose="020B0604030504040204" pitchFamily="34" charset="0"/>
-            </a:endParaRPr>
           </a:p>
         </p:txBody>
       </p:sp>
@@ -19642,7 +22196,7 @@
           </p:nvPr>
         </p:nvPicPr>
         <p:blipFill rotWithShape="1">
-          <a:blip r:embed="rId2" cstate="screen">
+          <a:blip r:embed="rId3" cstate="screen">
             <a:extLst>
               <a:ext uri="{28A0092B-C50C-407E-A947-70E740481C1C}">
                 <a14:useLocalDpi xmlns:a14="http://schemas.microsoft.com/office/drawing/2010/main"/>
@@ -19713,7 +22267,7 @@
                 <a:ea typeface="Verdana" panose="020B0604030504040204" pitchFamily="34" charset="0"/>
                 <a:cs typeface="Verdana" panose="020B0604030504040204" pitchFamily="34" charset="0"/>
               </a:rPr>
-              <a:t>Client side form validation is the process of checking the user’s input through the browser so that they can adjust their input accordingly before it is submitted to the server.</a:t>
+              <a:t>Client-side form validation is the process of checking the user’s input through the browser so that they can adjust their input accordingly before it is submitted to the server.</a:t>
             </a:r>
           </a:p>
           <a:p>
@@ -20006,7 +22560,7 @@
                 <a:ea typeface="Verdana" panose="020B0604030504040204" pitchFamily="34" charset="0"/>
                 <a:cs typeface="Verdana" panose="020B0604030504040204" pitchFamily="34" charset="0"/>
               </a:rPr>
-              <a:t>Targeting your element and attaching an event listener</a:t>
+              <a:t>Targeting Your Element and Attaching an Event Listener</a:t>
             </a:r>
           </a:p>
         </p:txBody>
@@ -20184,7 +22738,7 @@
                 <a:ea typeface="Verdana" panose="020B0604030504040204" pitchFamily="34" charset="0"/>
                 <a:cs typeface="Verdana" panose="020B0604030504040204" pitchFamily="34" charset="0"/>
               </a:rPr>
-              <a:t>Checking each input</a:t>
+              <a:t>Checking Each Input</a:t>
             </a:r>
           </a:p>
         </p:txBody>
@@ -20339,7 +22893,7 @@
                 <a:ea typeface="Verdana" panose="020B0604030504040204" pitchFamily="34" charset="0"/>
                 <a:cs typeface="Verdana" panose="020B0604030504040204" pitchFamily="34" charset="0"/>
               </a:rPr>
-              <a:t>Showing error messages</a:t>
+              <a:t>Showing Error Messages</a:t>
             </a:r>
           </a:p>
         </p:txBody>
@@ -20410,7 +22964,7 @@
                 <a:latin typeface="Verdana" panose="020B0604030504040204" pitchFamily="34" charset="0"/>
                 <a:ea typeface="Verdana" panose="020B0604030504040204" pitchFamily="34" charset="0"/>
                 <a:cs typeface="Verdana" panose="020B0604030504040204" pitchFamily="34" charset="0"/>
-                <a:hlinkClick r:id="rId2"/>
+                <a:hlinkClick r:id="rId3"/>
               </a:rPr>
               <a:t>http://localhost:3000/calculator/static</a:t>
             </a:r>
@@ -20532,6 +23086,115 @@
     <p:extLst>
       <p:ext uri="{BB962C8B-B14F-4D97-AF65-F5344CB8AC3E}">
         <p14:creationId xmlns:p14="http://schemas.microsoft.com/office/powerpoint/2010/main" val="2655629034"/>
+      </p:ext>
+    </p:extLst>
+  </p:cSld>
+  <p:clrMapOvr>
+    <a:masterClrMapping/>
+  </p:clrMapOvr>
+</p:sld>
+</file>
+
+<file path=ppt/slides/slide28.xml><?xml version="1.0" encoding="utf-8"?>
+<p:sld xmlns:a="http://schemas.openxmlformats.org/drawingml/2006/main" xmlns:r="http://schemas.openxmlformats.org/officeDocument/2006/relationships" xmlns:p="http://schemas.openxmlformats.org/presentationml/2006/main">
+  <p:cSld>
+    <p:spTree>
+      <p:nvGrpSpPr>
+        <p:cNvPr id="1" name=""/>
+        <p:cNvGrpSpPr/>
+        <p:nvPr/>
+      </p:nvGrpSpPr>
+      <p:grpSpPr>
+        <a:xfrm>
+          <a:off x="0" y="0"/>
+          <a:ext cx="0" cy="0"/>
+          <a:chOff x="0" y="0"/>
+          <a:chExt cx="0" cy="0"/>
+        </a:xfrm>
+      </p:grpSpPr>
+      <p:sp>
+        <p:nvSpPr>
+          <p:cNvPr id="2" name="Slide Number Placeholder 1"/>
+          <p:cNvSpPr>
+            <a:spLocks noGrp="1"/>
+          </p:cNvSpPr>
+          <p:nvPr>
+            <p:ph type="sldNum" sz="quarter" idx="14"/>
+          </p:nvPr>
+        </p:nvSpPr>
+        <p:spPr/>
+        <p:txBody>
+          <a:bodyPr/>
+          <a:lstStyle/>
+          <a:p>
+            <a:fld id="{12342C3A-DD85-7843-B416-BD52AB030D59}" type="slidenum">
+              <a:rPr lang="en-US" smtClean="0"/>
+              <a:pPr/>
+              <a:t>28</a:t>
+            </a:fld>
+            <a:endParaRPr lang="en-US" dirty="0"/>
+          </a:p>
+        </p:txBody>
+      </p:sp>
+      <p:sp>
+        <p:nvSpPr>
+          <p:cNvPr id="4" name="Text Placeholder 3"/>
+          <p:cNvSpPr>
+            <a:spLocks noGrp="1"/>
+          </p:cNvSpPr>
+          <p:nvPr>
+            <p:ph type="body" sz="quarter" idx="12"/>
+          </p:nvPr>
+        </p:nvSpPr>
+        <p:spPr>
+          <a:xfrm>
+            <a:off x="333075" y="2329447"/>
+            <a:ext cx="11522671" cy="1099553"/>
+          </a:xfrm>
+        </p:spPr>
+        <p:txBody>
+          <a:bodyPr/>
+          <a:lstStyle/>
+          <a:p>
+            <a:pPr algn="ctr"/>
+            <a:r>
+              <a:rPr lang="en-US" sz="3800" b="1" dirty="0">
+                <a:latin typeface="Verdana" panose="020B0604030504040204" pitchFamily="34" charset="0"/>
+                <a:ea typeface="Verdana" panose="020B0604030504040204" pitchFamily="34" charset="0"/>
+                <a:cs typeface="Verdana" panose="020B0604030504040204" pitchFamily="34" charset="0"/>
+              </a:rPr>
+              <a:t>Questions?</a:t>
+            </a:r>
+          </a:p>
+        </p:txBody>
+      </p:sp>
+      <p:pic>
+        <p:nvPicPr>
+          <p:cNvPr id="6" name="Picture Placeholder 5" descr="nanotechnology-173305070.jpg"/>
+          <p:cNvPicPr>
+            <a:picLocks noGrp="1" noChangeAspect="1"/>
+          </p:cNvPicPr>
+          <p:nvPr>
+            <p:ph type="pic" sz="quarter" idx="13"/>
+          </p:nvPr>
+        </p:nvPicPr>
+        <p:blipFill rotWithShape="1">
+          <a:blip r:embed="rId3" cstate="screen">
+            <a:extLst>
+              <a:ext uri="{28A0092B-C50C-407E-A947-70E740481C1C}">
+                <a14:useLocalDpi xmlns:a14="http://schemas.microsoft.com/office/drawing/2010/main"/>
+              </a:ext>
+            </a:extLst>
+          </a:blip>
+          <a:srcRect/>
+          <a:stretch/>
+        </p:blipFill>
+        <p:spPr/>
+      </p:pic>
+    </p:spTree>
+    <p:extLst>
+      <p:ext uri="{BB962C8B-B14F-4D97-AF65-F5344CB8AC3E}">
+        <p14:creationId xmlns:p14="http://schemas.microsoft.com/office/powerpoint/2010/main" val="2453138323"/>
       </p:ext>
     </p:extLst>
   </p:cSld>
@@ -20578,10 +23241,11 @@
           <a:bodyPr/>
           <a:lstStyle/>
           <a:p>
-            <a:pPr>
+            <a:pPr marL="0" indent="0">
               <a:buClr>
                 <a:srgbClr val="AB262E"/>
               </a:buClr>
+              <a:buNone/>
             </a:pPr>
             <a:r>
               <a:rPr lang="en-US" sz="2000" dirty="0">
@@ -20593,10 +23257,11 @@
             </a:r>
           </a:p>
           <a:p>
-            <a:pPr>
+            <a:pPr marL="0" indent="0">
               <a:buClr>
                 <a:srgbClr val="AB262E"/>
               </a:buClr>
+              <a:buNone/>
             </a:pPr>
             <a:r>
               <a:rPr lang="en-US" sz="2000" dirty="0">
@@ -20608,6 +23273,9 @@
             </a:r>
           </a:p>
           <a:p>
+            <a:pPr marL="0" indent="0">
+              <a:buNone/>
+            </a:pPr>
             <a:r>
               <a:rPr lang="en-US" sz="2000" dirty="0">
                 <a:latin typeface="Verdana" panose="020B0604030504040204" pitchFamily="34" charset="0"/>
@@ -20618,6 +23286,9 @@
             </a:r>
           </a:p>
           <a:p>
+            <a:pPr marL="0" indent="0">
+              <a:buNone/>
+            </a:pPr>
             <a:r>
               <a:rPr lang="en-US" sz="2000" dirty="0">
                 <a:latin typeface="Verdana" panose="020B0604030504040204" pitchFamily="34" charset="0"/>
@@ -20628,6 +23299,9 @@
             </a:r>
           </a:p>
           <a:p>
+            <a:pPr marL="0" indent="0">
+              <a:buNone/>
+            </a:pPr>
             <a:r>
               <a:rPr lang="en-US" sz="2000" dirty="0">
                 <a:latin typeface="Verdana" panose="020B0604030504040204" pitchFamily="34" charset="0"/>
@@ -20638,26 +23312,38 @@
             </a:r>
           </a:p>
           <a:p>
-            <a:pPr lvl="1">
-              <a:buFont typeface="Wingdings" pitchFamily="2" charset="2"/>
-              <a:buChar char="q"/>
-            </a:pPr>
+            <a:pPr lvl="1"/>
             <a:r>
               <a:rPr lang="en-US" sz="2000" dirty="0">
+                <a:solidFill>
+                  <a:srgbClr val="AB262E"/>
+                </a:solidFill>
                 <a:latin typeface="Verdana" panose="020B0604030504040204" pitchFamily="34" charset="0"/>
                 <a:ea typeface="Verdana" panose="020B0604030504040204" pitchFamily="34" charset="0"/>
                 <a:cs typeface="Verdana" panose="020B0604030504040204" pitchFamily="34" charset="0"/>
-                <a:hlinkClick r:id="rId2"/>
+                <a:hlinkClick r:id="rId3">
+                  <a:extLst>
+                    <a:ext uri="{A12FA001-AC4F-418D-AE19-62706E023703}">
+                      <ahyp:hlinkClr xmlns:ahyp="http://schemas.microsoft.com/office/drawing/2018/hyperlinkcolor" val="tx"/>
+                    </a:ext>
+                  </a:extLst>
+                </a:hlinkClick>
               </a:rPr>
               <a:t>https://kangax.github.io/compat-table/es6/</a:t>
             </a:r>
             <a:endParaRPr lang="en-US" sz="2000" dirty="0">
+              <a:solidFill>
+                <a:srgbClr val="AB262E"/>
+              </a:solidFill>
               <a:latin typeface="Verdana" panose="020B0604030504040204" pitchFamily="34" charset="0"/>
               <a:ea typeface="Verdana" panose="020B0604030504040204" pitchFamily="34" charset="0"/>
               <a:cs typeface="Verdana" panose="020B0604030504040204" pitchFamily="34" charset="0"/>
             </a:endParaRPr>
           </a:p>
           <a:p>
+            <a:pPr marL="0" indent="0">
+              <a:buNone/>
+            </a:pPr>
             <a:r>
               <a:rPr lang="en-US" sz="2000" dirty="0">
                 <a:latin typeface="Verdana" panose="020B0604030504040204" pitchFamily="34" charset="0"/>
@@ -20724,7 +23410,7 @@
                 <a:ea typeface="Verdana" panose="020B0604030504040204" pitchFamily="34" charset="0"/>
                 <a:cs typeface="Verdana" panose="020B0604030504040204" pitchFamily="34" charset="0"/>
               </a:rPr>
-              <a:t>Difference between Node.js and Browsers</a:t>
+              <a:t>Difference Between Node.js and Browsers</a:t>
             </a:r>
           </a:p>
         </p:txBody>
@@ -20870,7 +23556,7 @@
                 <a:ea typeface="Verdana" panose="020B0604030504040204" pitchFamily="34" charset="0"/>
                 <a:cs typeface="Verdana" panose="020B0604030504040204" pitchFamily="34" charset="0"/>
               </a:rPr>
-              <a:t>You can have as many script elements as you need, and use as many script files.</a:t>
+              <a:t>You can have as many script elements as you need and use as many script files.</a:t>
             </a:r>
           </a:p>
           <a:p>
@@ -20920,7 +23606,7 @@
         <p:spPr>
           <a:xfrm>
             <a:off x="302605" y="418354"/>
-            <a:ext cx="5791807" cy="1147979"/>
+            <a:ext cx="9875065" cy="1147979"/>
           </a:xfrm>
         </p:spPr>
         <p:txBody>
@@ -20936,7 +23622,7 @@
                 <a:ea typeface="Verdana" panose="020B0604030504040204" pitchFamily="34" charset="0"/>
                 <a:cs typeface="Verdana" panose="020B0604030504040204" pitchFamily="34" charset="0"/>
               </a:rPr>
-              <a:t>Running JavaScript in the browser</a:t>
+              <a:t>Running JavaScript in the Browser</a:t>
             </a:r>
             <a:endParaRPr lang="en-US" dirty="0"/>
           </a:p>
@@ -20957,7 +23643,7 @@
           <p:nvPr/>
         </p:nvPicPr>
         <p:blipFill>
-          <a:blip r:embed="rId2">
+          <a:blip r:embed="rId3">
             <a:extLst>
               <a:ext uri="{28A0092B-C50C-407E-A947-70E740481C1C}">
                 <a14:useLocalDpi xmlns:a14="http://schemas.microsoft.com/office/drawing/2010/main" val="0"/>
@@ -20993,7 +23679,7 @@
           <p:nvPr/>
         </p:nvPicPr>
         <p:blipFill>
-          <a:blip r:embed="rId3">
+          <a:blip r:embed="rId4">
             <a:extLst>
               <a:ext uri="{28A0092B-C50C-407E-A947-70E740481C1C}">
                 <a14:useLocalDpi xmlns:a14="http://schemas.microsoft.com/office/drawing/2010/main" val="0"/>
@@ -21231,7 +23917,7 @@
                 <a:ea typeface="Verdana" panose="020B0604030504040204" pitchFamily="34" charset="0"/>
                 <a:cs typeface="Verdana" panose="020B0604030504040204" pitchFamily="34" charset="0"/>
               </a:rPr>
-              <a:t>JavaScript libraries</a:t>
+              <a:t>JavaScript Libraries</a:t>
             </a:r>
           </a:p>
         </p:txBody>
@@ -21422,7 +24108,7 @@
                 <a:ea typeface="Verdana" panose="020B0604030504040204" pitchFamily="34" charset="0"/>
                 <a:cs typeface="Verdana" panose="020B0604030504040204" pitchFamily="34" charset="0"/>
               </a:rPr>
-              <a:t>How JavaScript is run in the browser</a:t>
+              <a:t>How JavaScript is Run in the Browser</a:t>
             </a:r>
           </a:p>
         </p:txBody>
@@ -21696,7 +24382,7 @@
           </p:nvPr>
         </p:nvPicPr>
         <p:blipFill rotWithShape="1">
-          <a:blip r:embed="rId2" cstate="screen">
+          <a:blip r:embed="rId3" cstate="screen">
             <a:extLst>
               <a:ext uri="{28A0092B-C50C-407E-A947-70E740481C1C}">
                 <a14:useLocalDpi xmlns:a14="http://schemas.microsoft.com/office/drawing/2010/main"/>
@@ -21883,7 +24569,7 @@
                 <a:ea typeface="Verdana" panose="020B0604030504040204" pitchFamily="34" charset="0"/>
                 <a:cs typeface="Verdana" panose="020B0604030504040204" pitchFamily="34" charset="0"/>
               </a:rPr>
-              <a:t>What is a DOM?</a:t>
+              <a:t>What is the DOM?</a:t>
             </a:r>
           </a:p>
         </p:txBody>
@@ -21903,7 +24589,7 @@
           <p:nvPr/>
         </p:nvPicPr>
         <p:blipFill>
-          <a:blip r:embed="rId2">
+          <a:blip r:embed="rId3">
             <a:extLst>
               <a:ext uri="{28A0092B-C50C-407E-A947-70E740481C1C}">
                 <a14:useLocalDpi xmlns:a14="http://schemas.microsoft.com/office/drawing/2010/main" val="0"/>

</xml_diff>